<commit_message>
some sampling fixed and neural research
</commit_message>
<xml_diff>
--- a/Supervised Learning.pptx
+++ b/Supervised Learning.pptx
@@ -201,7 +201,7 @@
           <a:p>
             <a:fld id="{93E535DD-106C-4541-B5AF-9672E5885387}" type="datetimeFigureOut">
               <a:rPr lang="en-US" smtClean="0"/>
-              <a:t>4/29/2023</a:t>
+              <a:t>5/1/2023</a:t>
             </a:fld>
             <a:endParaRPr lang="en-US"/>
           </a:p>
@@ -701,7 +701,7 @@
           <a:p>
             <a:fld id="{1C56E1C8-51FB-41FF-A952-5015197EF72E}" type="datetimeFigureOut">
               <a:rPr lang="en-GB" smtClean="0"/>
-              <a:t>29/04/2023</a:t>
+              <a:t>01/05/2023</a:t>
             </a:fld>
             <a:endParaRPr lang="en-GB"/>
           </a:p>
@@ -901,7 +901,7 @@
           <a:p>
             <a:fld id="{1C56E1C8-51FB-41FF-A952-5015197EF72E}" type="datetimeFigureOut">
               <a:rPr lang="en-GB" smtClean="0"/>
-              <a:t>29/04/2023</a:t>
+              <a:t>01/05/2023</a:t>
             </a:fld>
             <a:endParaRPr lang="en-GB"/>
           </a:p>
@@ -1111,7 +1111,7 @@
           <a:p>
             <a:fld id="{1C56E1C8-51FB-41FF-A952-5015197EF72E}" type="datetimeFigureOut">
               <a:rPr lang="en-GB" smtClean="0"/>
-              <a:t>29/04/2023</a:t>
+              <a:t>01/05/2023</a:t>
             </a:fld>
             <a:endParaRPr lang="en-GB"/>
           </a:p>
@@ -1311,7 +1311,7 @@
           <a:p>
             <a:fld id="{1C56E1C8-51FB-41FF-A952-5015197EF72E}" type="datetimeFigureOut">
               <a:rPr lang="en-GB" smtClean="0"/>
-              <a:t>29/04/2023</a:t>
+              <a:t>01/05/2023</a:t>
             </a:fld>
             <a:endParaRPr lang="en-GB"/>
           </a:p>
@@ -1587,7 +1587,7 @@
           <a:p>
             <a:fld id="{1C56E1C8-51FB-41FF-A952-5015197EF72E}" type="datetimeFigureOut">
               <a:rPr lang="en-GB" smtClean="0"/>
-              <a:t>29/04/2023</a:t>
+              <a:t>01/05/2023</a:t>
             </a:fld>
             <a:endParaRPr lang="en-GB"/>
           </a:p>
@@ -1855,7 +1855,7 @@
           <a:p>
             <a:fld id="{1C56E1C8-51FB-41FF-A952-5015197EF72E}" type="datetimeFigureOut">
               <a:rPr lang="en-GB" smtClean="0"/>
-              <a:t>29/04/2023</a:t>
+              <a:t>01/05/2023</a:t>
             </a:fld>
             <a:endParaRPr lang="en-GB"/>
           </a:p>
@@ -2270,7 +2270,7 @@
           <a:p>
             <a:fld id="{1C56E1C8-51FB-41FF-A952-5015197EF72E}" type="datetimeFigureOut">
               <a:rPr lang="en-GB" smtClean="0"/>
-              <a:t>29/04/2023</a:t>
+              <a:t>01/05/2023</a:t>
             </a:fld>
             <a:endParaRPr lang="en-GB"/>
           </a:p>
@@ -2412,7 +2412,7 @@
           <a:p>
             <a:fld id="{1C56E1C8-51FB-41FF-A952-5015197EF72E}" type="datetimeFigureOut">
               <a:rPr lang="en-GB" smtClean="0"/>
-              <a:t>29/04/2023</a:t>
+              <a:t>01/05/2023</a:t>
             </a:fld>
             <a:endParaRPr lang="en-GB"/>
           </a:p>
@@ -2525,7 +2525,7 @@
           <a:p>
             <a:fld id="{1C56E1C8-51FB-41FF-A952-5015197EF72E}" type="datetimeFigureOut">
               <a:rPr lang="en-GB" smtClean="0"/>
-              <a:t>29/04/2023</a:t>
+              <a:t>01/05/2023</a:t>
             </a:fld>
             <a:endParaRPr lang="en-GB"/>
           </a:p>
@@ -2838,7 +2838,7 @@
           <a:p>
             <a:fld id="{1C56E1C8-51FB-41FF-A952-5015197EF72E}" type="datetimeFigureOut">
               <a:rPr lang="en-GB" smtClean="0"/>
-              <a:t>29/04/2023</a:t>
+              <a:t>01/05/2023</a:t>
             </a:fld>
             <a:endParaRPr lang="en-GB"/>
           </a:p>
@@ -3127,7 +3127,7 @@
           <a:p>
             <a:fld id="{1C56E1C8-51FB-41FF-A952-5015197EF72E}" type="datetimeFigureOut">
               <a:rPr lang="en-GB" smtClean="0"/>
-              <a:t>29/04/2023</a:t>
+              <a:t>01/05/2023</a:t>
             </a:fld>
             <a:endParaRPr lang="en-GB"/>
           </a:p>
@@ -3370,7 +3370,7 @@
           <a:p>
             <a:fld id="{1C56E1C8-51FB-41FF-A952-5015197EF72E}" type="datetimeFigureOut">
               <a:rPr lang="en-GB" smtClean="0"/>
-              <a:t>29/04/2023</a:t>
+              <a:t>01/05/2023</a:t>
             </a:fld>
             <a:endParaRPr lang="en-GB"/>
           </a:p>
@@ -6275,10 +6275,10 @@
       </p:grpSpPr>
       <p:sp useBgFill="1">
         <p:nvSpPr>
-          <p:cNvPr id="29" name="Rectangle 28">
-            <a:extLst>
-              <a:ext uri="{FF2B5EF4-FFF2-40B4-BE49-F238E27FC236}">
-                <a16:creationId xmlns:a16="http://schemas.microsoft.com/office/drawing/2014/main" id="{385E1BDC-A9B0-4A87-82E3-F3187F69A802}"/>
+          <p:cNvPr id="40" name="Rectangle 39">
+            <a:extLst>
+              <a:ext uri="{FF2B5EF4-FFF2-40B4-BE49-F238E27FC236}">
+                <a16:creationId xmlns:a16="http://schemas.microsoft.com/office/drawing/2014/main" id="{8761DDFE-071F-4200-B0AA-394476C2D2D6}"/>
               </a:ext>
               <a:ext uri="{C183D7F6-B498-43B3-948B-1728B52AA6E4}">
                 <adec:decorative xmlns:adec="http://schemas.microsoft.com/office/drawing/2017/decorative" val="1"/>
@@ -6298,8 +6298,8 @@
         </p:nvSpPr>
         <p:spPr>
           <a:xfrm>
-            <a:off x="0" y="0"/>
-            <a:ext cx="12192000" cy="6858000"/>
+            <a:off x="-1" y="0"/>
+            <a:ext cx="12188952" cy="6858000"/>
           </a:xfrm>
           <a:prstGeom prst="rect">
             <a:avLst/>
@@ -6333,125 +6333,26 @@
           </a:p>
         </p:txBody>
       </p:sp>
-      <p:sp useBgFill="1">
-        <p:nvSpPr>
-          <p:cNvPr id="31" name="Rectangle 30">
-            <a:extLst>
-              <a:ext uri="{FF2B5EF4-FFF2-40B4-BE49-F238E27FC236}">
-                <a16:creationId xmlns:a16="http://schemas.microsoft.com/office/drawing/2014/main" id="{0990C621-3B8B-4820-8328-D47EF7CE823C}"/>
-              </a:ext>
-              <a:ext uri="{C183D7F6-B498-43B3-948B-1728B52AA6E4}">
-                <adec:decorative xmlns:adec="http://schemas.microsoft.com/office/drawing/2017/decorative" val="1"/>
-              </a:ext>
-            </a:extLst>
-          </p:cNvPr>
-          <p:cNvSpPr>
-            <a:spLocks noGrp="1" noRot="1" noChangeAspect="1" noMove="1" noResize="1" noEditPoints="1" noAdjustHandles="1" noChangeArrowheads="1" noChangeShapeType="1" noTextEdit="1"/>
-          </p:cNvSpPr>
-          <p:nvPr>
-            <p:extLst>
-              <p:ext uri="{386F3935-93C4-4BCD-93E2-E3B085C9AB24}">
-                <p16:designElem xmlns:p16="http://schemas.microsoft.com/office/powerpoint/2015/main" val="1"/>
-              </p:ext>
-            </p:extLst>
+      <p:sp>
+        <p:nvSpPr>
+          <p:cNvPr id="2" name="Title 1">
+            <a:extLst>
+              <a:ext uri="{FF2B5EF4-FFF2-40B4-BE49-F238E27FC236}">
+                <a16:creationId xmlns:a16="http://schemas.microsoft.com/office/drawing/2014/main" id="{FA6489E2-7FE1-9296-4114-3D2D3A8CBDEC}"/>
+              </a:ext>
+            </a:extLst>
+          </p:cNvPr>
+          <p:cNvSpPr>
+            <a:spLocks noGrp="1"/>
+          </p:cNvSpPr>
+          <p:nvPr>
+            <p:ph type="title"/>
           </p:nvPr>
         </p:nvSpPr>
         <p:spPr>
           <a:xfrm>
-            <a:off x="554416" y="365125"/>
-            <a:ext cx="11167447" cy="2089317"/>
-          </a:xfrm>
-          <a:prstGeom prst="rect">
-            <a:avLst/>
-          </a:prstGeom>
-          <a:ln w="12700">
-            <a:solidFill>
-              <a:srgbClr val="DEDEDE"/>
-            </a:solidFill>
-          </a:ln>
-          <a:effectLst>
-            <a:outerShdw blurRad="50800" dist="38100" dir="2700000" algn="tl" rotWithShape="0">
-              <a:schemeClr val="bg2">
-                <a:lumMod val="85000"/>
-                <a:alpha val="50000"/>
-              </a:schemeClr>
-            </a:outerShdw>
-          </a:effectLst>
-        </p:spPr>
-        <p:style>
-          <a:lnRef idx="2">
-            <a:schemeClr val="accent1">
-              <a:shade val="50000"/>
-            </a:schemeClr>
-          </a:lnRef>
-          <a:fillRef idx="1">
-            <a:schemeClr val="accent1"/>
-          </a:fillRef>
-          <a:effectRef idx="0">
-            <a:schemeClr val="accent1"/>
-          </a:effectRef>
-          <a:fontRef idx="minor">
-            <a:schemeClr val="lt1"/>
-          </a:fontRef>
-        </p:style>
-        <p:txBody>
-          <a:bodyPr rtlCol="0" anchor="ctr"/>
-          <a:lstStyle/>
-          <a:p>
-            <a:pPr marL="0" marR="0" lvl="0" indent="0" algn="ctr" defTabSz="914400" rtl="0" eaLnBrk="1" fontAlgn="auto" latinLnBrk="0" hangingPunct="1">
-              <a:lnSpc>
-                <a:spcPct val="100000"/>
-              </a:lnSpc>
-              <a:spcBef>
-                <a:spcPts val="0"/>
-              </a:spcBef>
-              <a:spcAft>
-                <a:spcPts val="0"/>
-              </a:spcAft>
-              <a:buClrTx/>
-              <a:buSzTx/>
-              <a:buFontTx/>
-              <a:buNone/>
-              <a:tabLst/>
-              <a:defRPr/>
-            </a:pPr>
-            <a:endParaRPr kumimoji="0" lang="en-US" sz="1800" b="0" i="0" u="none" strike="noStrike" kern="1200" cap="none" spc="0" normalizeH="0" baseline="0" noProof="0">
-              <a:ln>
-                <a:noFill/>
-              </a:ln>
-              <a:solidFill>
-                <a:prstClr val="white"/>
-              </a:solidFill>
-              <a:effectLst/>
-              <a:uLnTx/>
-              <a:uFillTx/>
-              <a:latin typeface="Calibri" panose="020F0502020204030204"/>
-              <a:ea typeface="+mn-ea"/>
-              <a:cs typeface="+mn-cs"/>
-            </a:endParaRPr>
-          </a:p>
-        </p:txBody>
-      </p:sp>
-      <p:sp>
-        <p:nvSpPr>
-          <p:cNvPr id="2" name="Title 1">
-            <a:extLst>
-              <a:ext uri="{FF2B5EF4-FFF2-40B4-BE49-F238E27FC236}">
-                <a16:creationId xmlns:a16="http://schemas.microsoft.com/office/drawing/2014/main" id="{FA6489E2-7FE1-9296-4114-3D2D3A8CBDEC}"/>
-              </a:ext>
-            </a:extLst>
-          </p:cNvPr>
-          <p:cNvSpPr>
-            <a:spLocks noGrp="1"/>
-          </p:cNvSpPr>
-          <p:nvPr>
-            <p:ph type="title"/>
-          </p:nvPr>
-        </p:nvSpPr>
-        <p:spPr>
-          <a:xfrm>
-            <a:off x="1051560" y="586822"/>
-            <a:ext cx="3657600" cy="1645920"/>
+            <a:off x="838198" y="547815"/>
+            <a:ext cx="5167185" cy="1680519"/>
           </a:xfrm>
         </p:spPr>
         <p:txBody>
@@ -6461,7 +6362,7 @@
           <a:lstStyle/>
           <a:p>
             <a:r>
-              <a:rPr lang="en-US" sz="3200"/>
+              <a:rPr lang="en-US" sz="4000"/>
               <a:t>Implementation work already carried out</a:t>
             </a:r>
           </a:p>
@@ -6469,181 +6370,20 @@
       </p:sp>
       <p:sp>
         <p:nvSpPr>
-          <p:cNvPr id="33" name="Rectangle 32">
-            <a:extLst>
-              <a:ext uri="{FF2B5EF4-FFF2-40B4-BE49-F238E27FC236}">
-                <a16:creationId xmlns:a16="http://schemas.microsoft.com/office/drawing/2014/main" id="{C1A2385B-1D2A-4E17-84FA-6CB7F0AAE473}"/>
-              </a:ext>
-              <a:ext uri="{C183D7F6-B498-43B3-948B-1728B52AA6E4}">
-                <adec:decorative xmlns:adec="http://schemas.microsoft.com/office/drawing/2017/decorative" val="1"/>
-              </a:ext>
-            </a:extLst>
-          </p:cNvPr>
-          <p:cNvSpPr>
-            <a:spLocks noGrp="1" noRot="1" noChangeAspect="1" noMove="1" noResize="1" noEditPoints="1" noAdjustHandles="1" noChangeArrowheads="1" noChangeShapeType="1" noTextEdit="1"/>
-          </p:cNvSpPr>
-          <p:nvPr>
-            <p:extLst>
-              <p:ext uri="{386F3935-93C4-4BCD-93E2-E3B085C9AB24}">
-                <p16:designElem xmlns:p16="http://schemas.microsoft.com/office/powerpoint/2015/main" val="1"/>
-              </p:ext>
-            </p:extLst>
-          </p:nvPr>
+          <p:cNvPr id="13" name="TextBox 2">
+            <a:extLst>
+              <a:ext uri="{FF2B5EF4-FFF2-40B4-BE49-F238E27FC236}">
+                <a16:creationId xmlns:a16="http://schemas.microsoft.com/office/drawing/2014/main" id="{E45A7F25-4D5B-1E71-87D4-26138331D9DA}"/>
+              </a:ext>
+            </a:extLst>
+          </p:cNvPr>
+          <p:cNvSpPr txBox="1"/>
+          <p:nvPr/>
         </p:nvSpPr>
         <p:spPr>
           <a:xfrm>
-            <a:off x="490408" y="1057739"/>
-            <a:ext cx="128016" cy="704088"/>
-          </a:xfrm>
-          <a:prstGeom prst="rect">
-            <a:avLst/>
-          </a:prstGeom>
-          <a:solidFill>
-            <a:schemeClr val="accent2"/>
-          </a:solidFill>
-          <a:ln>
-            <a:noFill/>
-          </a:ln>
-        </p:spPr>
-        <p:style>
-          <a:lnRef idx="2">
-            <a:schemeClr val="accent1">
-              <a:shade val="50000"/>
-            </a:schemeClr>
-          </a:lnRef>
-          <a:fillRef idx="1">
-            <a:schemeClr val="accent1"/>
-          </a:fillRef>
-          <a:effectRef idx="0">
-            <a:schemeClr val="accent1"/>
-          </a:effectRef>
-          <a:fontRef idx="minor">
-            <a:schemeClr val="lt1"/>
-          </a:fontRef>
-        </p:style>
-        <p:txBody>
-          <a:bodyPr rtlCol="0" anchor="ctr"/>
-          <a:lstStyle/>
-          <a:p>
-            <a:pPr algn="ctr"/>
-            <a:endParaRPr lang="en-US" dirty="0">
-              <a:solidFill>
-                <a:prstClr val="white"/>
-              </a:solidFill>
-              <a:latin typeface="Calibri" panose="020F0502020204030204"/>
-            </a:endParaRPr>
-          </a:p>
-        </p:txBody>
-      </p:sp>
-      <p:sp>
-        <p:nvSpPr>
-          <p:cNvPr id="35" name="Rectangle 34">
-            <a:extLst>
-              <a:ext uri="{FF2B5EF4-FFF2-40B4-BE49-F238E27FC236}">
-                <a16:creationId xmlns:a16="http://schemas.microsoft.com/office/drawing/2014/main" id="{5E791F2F-79DB-4CC0-9FA1-001E3E91E8B7}"/>
-              </a:ext>
-              <a:ext uri="{C183D7F6-B498-43B3-948B-1728B52AA6E4}">
-                <adec:decorative xmlns:adec="http://schemas.microsoft.com/office/drawing/2017/decorative" val="1"/>
-              </a:ext>
-            </a:extLst>
-          </p:cNvPr>
-          <p:cNvSpPr>
-            <a:spLocks noGrp="1" noRot="1" noChangeAspect="1" noMove="1" noResize="1" noEditPoints="1" noAdjustHandles="1" noChangeArrowheads="1" noChangeShapeType="1" noTextEdit="1"/>
-          </p:cNvSpPr>
-          <p:nvPr>
-            <p:extLst>
-              <p:ext uri="{386F3935-93C4-4BCD-93E2-E3B085C9AB24}">
-                <p16:designElem xmlns:p16="http://schemas.microsoft.com/office/powerpoint/2015/main" val="1"/>
-              </p:ext>
-            </p:extLst>
-          </p:nvPr>
-        </p:nvSpPr>
-        <p:spPr>
-          <a:xfrm rot="5400000">
-            <a:off x="4243541" y="1400638"/>
-            <a:ext cx="1463040" cy="18288"/>
-          </a:xfrm>
-          <a:prstGeom prst="rect">
-            <a:avLst/>
-          </a:prstGeom>
-          <a:solidFill>
-            <a:srgbClr val="D5D5D5"/>
-          </a:solidFill>
-          <a:ln w="3175">
-            <a:noFill/>
-          </a:ln>
-          <a:effectLst/>
-        </p:spPr>
-        <p:style>
-          <a:lnRef idx="2">
-            <a:schemeClr val="accent1">
-              <a:shade val="50000"/>
-            </a:schemeClr>
-          </a:lnRef>
-          <a:fillRef idx="1">
-            <a:schemeClr val="accent1"/>
-          </a:fillRef>
-          <a:effectRef idx="0">
-            <a:schemeClr val="accent1"/>
-          </a:effectRef>
-          <a:fontRef idx="minor">
-            <a:schemeClr val="lt1"/>
-          </a:fontRef>
-        </p:style>
-        <p:txBody>
-          <a:bodyPr rtlCol="0" anchor="ctr"/>
-          <a:lstStyle/>
-          <a:p>
-            <a:pPr marL="0" marR="0" lvl="0" indent="0" algn="ctr" defTabSz="914400" rtl="0" eaLnBrk="1" fontAlgn="auto" latinLnBrk="0" hangingPunct="1">
-              <a:lnSpc>
-                <a:spcPct val="100000"/>
-              </a:lnSpc>
-              <a:spcBef>
-                <a:spcPts val="0"/>
-              </a:spcBef>
-              <a:spcAft>
-                <a:spcPts val="0"/>
-              </a:spcAft>
-              <a:buClrTx/>
-              <a:buSzTx/>
-              <a:buFontTx/>
-              <a:buNone/>
-              <a:tabLst/>
-              <a:defRPr/>
-            </a:pPr>
-            <a:endParaRPr kumimoji="0" lang="en-US" sz="1800" b="0" i="0" u="none" strike="noStrike" kern="1200" cap="none" spc="0" normalizeH="0" baseline="0" noProof="0">
-              <a:ln>
-                <a:noFill/>
-              </a:ln>
-              <a:solidFill>
-                <a:prstClr val="white"/>
-              </a:solidFill>
-              <a:effectLst/>
-              <a:uLnTx/>
-              <a:uFillTx/>
-              <a:latin typeface="Calibri" panose="020F0502020204030204"/>
-              <a:ea typeface="+mn-ea"/>
-              <a:cs typeface="+mn-cs"/>
-            </a:endParaRPr>
-          </a:p>
-        </p:txBody>
-      </p:sp>
-      <p:sp>
-        <p:nvSpPr>
-          <p:cNvPr id="13" name="TextBox 2">
-            <a:extLst>
-              <a:ext uri="{FF2B5EF4-FFF2-40B4-BE49-F238E27FC236}">
-                <a16:creationId xmlns:a16="http://schemas.microsoft.com/office/drawing/2014/main" id="{E45A7F25-4D5B-1E71-87D4-26138331D9DA}"/>
-              </a:ext>
-            </a:extLst>
-          </p:cNvPr>
-          <p:cNvSpPr txBox="1"/>
-          <p:nvPr/>
-        </p:nvSpPr>
-        <p:spPr>
-          <a:xfrm>
-            <a:off x="5250106" y="586822"/>
-            <a:ext cx="6106742" cy="1645920"/>
+            <a:off x="6186619" y="547815"/>
+            <a:ext cx="5178960" cy="1680519"/>
           </a:xfrm>
           <a:prstGeom prst="rect">
             <a:avLst/>
@@ -6666,7 +6406,7 @@
               <a:buChar char="•"/>
             </a:pPr>
             <a:r>
-              <a:rPr lang="en-US" dirty="0"/>
+              <a:rPr lang="en-US" sz="1900"/>
               <a:t>Data preprocess</a:t>
             </a:r>
           </a:p>
@@ -6682,7 +6422,7 @@
               <a:buChar char="•"/>
             </a:pPr>
             <a:r>
-              <a:rPr lang="en-US" dirty="0"/>
+              <a:rPr lang="en-US" sz="1900"/>
               <a:t>Correlation analysis</a:t>
             </a:r>
           </a:p>
@@ -6698,7 +6438,7 @@
               <a:buChar char="•"/>
             </a:pPr>
             <a:r>
-              <a:rPr lang="en-US" dirty="0"/>
+              <a:rPr lang="en-US" sz="1900"/>
               <a:t>Feature selection (based on correlation results)</a:t>
             </a:r>
           </a:p>
@@ -6714,7 +6454,7 @@
               <a:buChar char="•"/>
             </a:pPr>
             <a:r>
-              <a:rPr lang="en-US" dirty="0"/>
+              <a:rPr lang="en-US" sz="1900"/>
               <a:t>Initial algorithm comparison</a:t>
             </a:r>
           </a:p>
@@ -6748,8 +6488,8 @@
         </p:blipFill>
         <p:spPr>
           <a:xfrm>
-            <a:off x="1243161" y="2729397"/>
-            <a:ext cx="4110753" cy="3483864"/>
+            <a:off x="1232324" y="2421924"/>
+            <a:ext cx="4378933" cy="3711146"/>
           </a:xfrm>
           <a:prstGeom prst="rect">
             <a:avLst/>
@@ -6758,10 +6498,10 @@
       </p:pic>
       <p:pic>
         <p:nvPicPr>
-          <p:cNvPr id="5" name="Picture 4" descr="A picture containing text, screenshot, rectangle, colorfulness&#10;&#10;Description automatically generated">
-            <a:extLst>
-              <a:ext uri="{FF2B5EF4-FFF2-40B4-BE49-F238E27FC236}">
-                <a16:creationId xmlns:a16="http://schemas.microsoft.com/office/drawing/2014/main" id="{1A8CACE9-45BD-C566-D7FC-2A6F4A282B9B}"/>
+          <p:cNvPr id="4" name="Picture 3" descr="A picture containing text, screenshot, diagram, rectangle&#10;&#10;Description automatically generated">
+            <a:extLst>
+              <a:ext uri="{FF2B5EF4-FFF2-40B4-BE49-F238E27FC236}">
+                <a16:creationId xmlns:a16="http://schemas.microsoft.com/office/drawing/2014/main" id="{956B954E-4FAB-F56F-14DB-E51C7A9CCF44}"/>
               </a:ext>
             </a:extLst>
           </p:cNvPr>
@@ -6784,8 +6524,8 @@
         </p:blipFill>
         <p:spPr>
           <a:xfrm>
-            <a:off x="6683287" y="2729397"/>
-            <a:ext cx="4554069" cy="3483864"/>
+            <a:off x="6395398" y="2421924"/>
+            <a:ext cx="4773177" cy="3711146"/>
           </a:xfrm>
           <a:prstGeom prst="rect">
             <a:avLst/>

</xml_diff>

<commit_message>
Some conclusiong and work in PP
</commit_message>
<xml_diff>
--- a/Supervised Learning.pptx
+++ b/Supervised Learning.pptx
@@ -5,7 +5,7 @@
     <p:sldMasterId id="2147483648" r:id="rId1"/>
   </p:sldMasterIdLst>
   <p:notesMasterIdLst>
-    <p:notesMasterId r:id="rId12"/>
+    <p:notesMasterId r:id="rId14"/>
   </p:notesMasterIdLst>
   <p:sldIdLst>
     <p:sldId id="260" r:id="rId2"/>
@@ -18,6 +18,8 @@
     <p:sldId id="268" r:id="rId9"/>
     <p:sldId id="266" r:id="rId10"/>
     <p:sldId id="267" r:id="rId11"/>
+    <p:sldId id="269" r:id="rId12"/>
+    <p:sldId id="270" r:id="rId13"/>
   </p:sldIdLst>
   <p:sldSz cx="12192000" cy="6858000"/>
   <p:notesSz cx="6858000" cy="9144000"/>
@@ -206,7 +208,7 @@
           <a:p>
             <a:fld id="{93E535DD-106C-4541-B5AF-9672E5885387}" type="datetimeFigureOut">
               <a:rPr lang="en-US" smtClean="0"/>
-              <a:t>5/15/2023</a:t>
+              <a:t>5/21/2023</a:t>
             </a:fld>
             <a:endParaRPr lang="en-US"/>
           </a:p>
@@ -706,7 +708,7 @@
           <a:p>
             <a:fld id="{1C56E1C8-51FB-41FF-A952-5015197EF72E}" type="datetimeFigureOut">
               <a:rPr lang="en-GB" smtClean="0"/>
-              <a:t>15/05/2023</a:t>
+              <a:t>21/05/2023</a:t>
             </a:fld>
             <a:endParaRPr lang="en-GB"/>
           </a:p>
@@ -906,7 +908,7 @@
           <a:p>
             <a:fld id="{1C56E1C8-51FB-41FF-A952-5015197EF72E}" type="datetimeFigureOut">
               <a:rPr lang="en-GB" smtClean="0"/>
-              <a:t>15/05/2023</a:t>
+              <a:t>21/05/2023</a:t>
             </a:fld>
             <a:endParaRPr lang="en-GB"/>
           </a:p>
@@ -1116,7 +1118,7 @@
           <a:p>
             <a:fld id="{1C56E1C8-51FB-41FF-A952-5015197EF72E}" type="datetimeFigureOut">
               <a:rPr lang="en-GB" smtClean="0"/>
-              <a:t>15/05/2023</a:t>
+              <a:t>21/05/2023</a:t>
             </a:fld>
             <a:endParaRPr lang="en-GB"/>
           </a:p>
@@ -1316,7 +1318,7 @@
           <a:p>
             <a:fld id="{1C56E1C8-51FB-41FF-A952-5015197EF72E}" type="datetimeFigureOut">
               <a:rPr lang="en-GB" smtClean="0"/>
-              <a:t>15/05/2023</a:t>
+              <a:t>21/05/2023</a:t>
             </a:fld>
             <a:endParaRPr lang="en-GB"/>
           </a:p>
@@ -1592,7 +1594,7 @@
           <a:p>
             <a:fld id="{1C56E1C8-51FB-41FF-A952-5015197EF72E}" type="datetimeFigureOut">
               <a:rPr lang="en-GB" smtClean="0"/>
-              <a:t>15/05/2023</a:t>
+              <a:t>21/05/2023</a:t>
             </a:fld>
             <a:endParaRPr lang="en-GB"/>
           </a:p>
@@ -1860,7 +1862,7 @@
           <a:p>
             <a:fld id="{1C56E1C8-51FB-41FF-A952-5015197EF72E}" type="datetimeFigureOut">
               <a:rPr lang="en-GB" smtClean="0"/>
-              <a:t>15/05/2023</a:t>
+              <a:t>21/05/2023</a:t>
             </a:fld>
             <a:endParaRPr lang="en-GB"/>
           </a:p>
@@ -2275,7 +2277,7 @@
           <a:p>
             <a:fld id="{1C56E1C8-51FB-41FF-A952-5015197EF72E}" type="datetimeFigureOut">
               <a:rPr lang="en-GB" smtClean="0"/>
-              <a:t>15/05/2023</a:t>
+              <a:t>21/05/2023</a:t>
             </a:fld>
             <a:endParaRPr lang="en-GB"/>
           </a:p>
@@ -2417,7 +2419,7 @@
           <a:p>
             <a:fld id="{1C56E1C8-51FB-41FF-A952-5015197EF72E}" type="datetimeFigureOut">
               <a:rPr lang="en-GB" smtClean="0"/>
-              <a:t>15/05/2023</a:t>
+              <a:t>21/05/2023</a:t>
             </a:fld>
             <a:endParaRPr lang="en-GB"/>
           </a:p>
@@ -2530,7 +2532,7 @@
           <a:p>
             <a:fld id="{1C56E1C8-51FB-41FF-A952-5015197EF72E}" type="datetimeFigureOut">
               <a:rPr lang="en-GB" smtClean="0"/>
-              <a:t>15/05/2023</a:t>
+              <a:t>21/05/2023</a:t>
             </a:fld>
             <a:endParaRPr lang="en-GB"/>
           </a:p>
@@ -2843,7 +2845,7 @@
           <a:p>
             <a:fld id="{1C56E1C8-51FB-41FF-A952-5015197EF72E}" type="datetimeFigureOut">
               <a:rPr lang="en-GB" smtClean="0"/>
-              <a:t>15/05/2023</a:t>
+              <a:t>21/05/2023</a:t>
             </a:fld>
             <a:endParaRPr lang="en-GB"/>
           </a:p>
@@ -3132,7 +3134,7 @@
           <a:p>
             <a:fld id="{1C56E1C8-51FB-41FF-A952-5015197EF72E}" type="datetimeFigureOut">
               <a:rPr lang="en-GB" smtClean="0"/>
-              <a:t>15/05/2023</a:t>
+              <a:t>21/05/2023</a:t>
             </a:fld>
             <a:endParaRPr lang="en-GB"/>
           </a:p>
@@ -3375,7 +3377,7 @@
           <a:p>
             <a:fld id="{1C56E1C8-51FB-41FF-A952-5015197EF72E}" type="datetimeFigureOut">
               <a:rPr lang="en-GB" smtClean="0"/>
-              <a:t>15/05/2023</a:t>
+              <a:t>21/05/2023</a:t>
             </a:fld>
             <a:endParaRPr lang="en-GB"/>
           </a:p>
@@ -4444,6 +4446,14 @@
 <file path=ppt/slides/slide10.xml><?xml version="1.0" encoding="utf-8"?>
 <p:sld xmlns:a="http://schemas.openxmlformats.org/drawingml/2006/main" xmlns:r="http://schemas.openxmlformats.org/officeDocument/2006/relationships" xmlns:p="http://schemas.openxmlformats.org/presentationml/2006/main">
   <p:cSld>
+    <p:bg>
+      <p:bgPr>
+        <a:solidFill>
+          <a:schemeClr val="bg1"/>
+        </a:solidFill>
+        <a:effectLst/>
+      </p:bgPr>
+    </p:bg>
     <p:spTree>
       <p:nvGrpSpPr>
         <p:cNvPr id="1" name=""/>
@@ -4458,6 +4468,66 @@
           <a:chExt cx="0" cy="0"/>
         </a:xfrm>
       </p:grpSpPr>
+      <p:sp useBgFill="1">
+        <p:nvSpPr>
+          <p:cNvPr id="13" name="Rectangle 12">
+            <a:extLst>
+              <a:ext uri="{FF2B5EF4-FFF2-40B4-BE49-F238E27FC236}">
+                <a16:creationId xmlns:a16="http://schemas.microsoft.com/office/drawing/2014/main" id="{7C98A213-5994-475E-B327-DC6EC27FBA8B}"/>
+              </a:ext>
+              <a:ext uri="{C183D7F6-B498-43B3-948B-1728B52AA6E4}">
+                <adec:decorative xmlns:adec="http://schemas.microsoft.com/office/drawing/2017/decorative" val="1"/>
+              </a:ext>
+            </a:extLst>
+          </p:cNvPr>
+          <p:cNvSpPr>
+            <a:spLocks noGrp="1" noRot="1" noChangeAspect="1" noMove="1" noResize="1" noEditPoints="1" noAdjustHandles="1" noChangeArrowheads="1" noChangeShapeType="1" noTextEdit="1"/>
+          </p:cNvSpPr>
+          <p:nvPr>
+            <p:extLst>
+              <p:ext uri="{386F3935-93C4-4BCD-93E2-E3B085C9AB24}">
+                <p16:designElem xmlns:p16="http://schemas.microsoft.com/office/powerpoint/2015/main" val="1"/>
+              </p:ext>
+            </p:extLst>
+          </p:nvPr>
+        </p:nvSpPr>
+        <p:spPr>
+          <a:xfrm>
+            <a:off x="0" y="0"/>
+            <a:ext cx="12188952" cy="6858000"/>
+          </a:xfrm>
+          <a:prstGeom prst="rect">
+            <a:avLst/>
+          </a:prstGeom>
+          <a:ln>
+            <a:noFill/>
+          </a:ln>
+        </p:spPr>
+        <p:style>
+          <a:lnRef idx="2">
+            <a:schemeClr val="accent1">
+              <a:shade val="50000"/>
+            </a:schemeClr>
+          </a:lnRef>
+          <a:fillRef idx="1">
+            <a:schemeClr val="accent1"/>
+          </a:fillRef>
+          <a:effectRef idx="0">
+            <a:schemeClr val="accent1"/>
+          </a:effectRef>
+          <a:fontRef idx="minor">
+            <a:schemeClr val="lt1"/>
+          </a:fontRef>
+        </p:style>
+        <p:txBody>
+          <a:bodyPr rtlCol="0" anchor="ctr"/>
+          <a:lstStyle/>
+          <a:p>
+            <a:pPr algn="ctr"/>
+            <a:endParaRPr lang="en-US"/>
+          </a:p>
+        </p:txBody>
+      </p:sp>
       <p:sp>
         <p:nvSpPr>
           <p:cNvPr id="2" name="Title 1">
@@ -4474,27 +4544,1747 @@
             <p:ph type="title"/>
           </p:nvPr>
         </p:nvSpPr>
-        <p:spPr/>
+        <p:spPr>
+          <a:xfrm>
+            <a:off x="638881" y="670218"/>
+            <a:ext cx="10909640" cy="1065836"/>
+          </a:xfrm>
+        </p:spPr>
         <p:txBody>
-          <a:bodyPr/>
+          <a:bodyPr vert="horz" lIns="91440" tIns="45720" rIns="91440" bIns="45720" rtlCol="0" anchor="ctr">
+            <a:normAutofit/>
+          </a:bodyPr>
           <a:lstStyle/>
           <a:p>
-            <a:r>
-              <a:rPr lang="en-US" dirty="0" err="1"/>
-              <a:t>Graficos</a:t>
-            </a:r>
-            <a:r>
-              <a:rPr lang="en-US" dirty="0"/>
-              <a:t> do recall</a:t>
-            </a:r>
-            <a:endParaRPr lang="en-GB" dirty="0"/>
+            <a:pPr algn="ctr"/>
+            <a:r>
+              <a:rPr lang="en-US" sz="6600" dirty="0">
+                <a:latin typeface="Lexend"/>
+              </a:rPr>
+              <a:t>K-Nearest Neighbors</a:t>
+            </a:r>
           </a:p>
         </p:txBody>
       </p:sp>
+      <p:sp>
+        <p:nvSpPr>
+          <p:cNvPr id="15" name="sketch line">
+            <a:extLst>
+              <a:ext uri="{FF2B5EF4-FFF2-40B4-BE49-F238E27FC236}">
+                <a16:creationId xmlns:a16="http://schemas.microsoft.com/office/drawing/2014/main" id="{4B030A0D-0DAD-4A99-89BB-419527D6A64B}"/>
+              </a:ext>
+              <a:ext uri="{C183D7F6-B498-43B3-948B-1728B52AA6E4}">
+                <adec:decorative xmlns:adec="http://schemas.microsoft.com/office/drawing/2017/decorative" val="1"/>
+              </a:ext>
+            </a:extLst>
+          </p:cNvPr>
+          <p:cNvSpPr>
+            <a:spLocks noGrp="1" noRot="1" noChangeAspect="1" noMove="1" noResize="1" noEditPoints="1" noAdjustHandles="1" noChangeArrowheads="1" noChangeShapeType="1" noTextEdit="1"/>
+          </p:cNvSpPr>
+          <p:nvPr>
+            <p:extLst>
+              <p:ext uri="{386F3935-93C4-4BCD-93E2-E3B085C9AB24}">
+                <p16:designElem xmlns:p16="http://schemas.microsoft.com/office/powerpoint/2015/main" val="1"/>
+              </p:ext>
+            </p:extLst>
+          </p:nvPr>
+        </p:nvSpPr>
+        <p:spPr>
+          <a:xfrm>
+            <a:off x="3389376" y="1800088"/>
+            <a:ext cx="5410200" cy="18288"/>
+          </a:xfrm>
+          <a:custGeom>
+            <a:avLst/>
+            <a:gdLst>
+              <a:gd name="connsiteX0" fmla="*/ 0 w 5410200"/>
+              <a:gd name="connsiteY0" fmla="*/ 0 h 18288"/>
+              <a:gd name="connsiteX1" fmla="*/ 568071 w 5410200"/>
+              <a:gd name="connsiteY1" fmla="*/ 0 h 18288"/>
+              <a:gd name="connsiteX2" fmla="*/ 1298448 w 5410200"/>
+              <a:gd name="connsiteY2" fmla="*/ 0 h 18288"/>
+              <a:gd name="connsiteX3" fmla="*/ 1920621 w 5410200"/>
+              <a:gd name="connsiteY3" fmla="*/ 0 h 18288"/>
+              <a:gd name="connsiteX4" fmla="*/ 2488692 w 5410200"/>
+              <a:gd name="connsiteY4" fmla="*/ 0 h 18288"/>
+              <a:gd name="connsiteX5" fmla="*/ 3219069 w 5410200"/>
+              <a:gd name="connsiteY5" fmla="*/ 0 h 18288"/>
+              <a:gd name="connsiteX6" fmla="*/ 3895344 w 5410200"/>
+              <a:gd name="connsiteY6" fmla="*/ 0 h 18288"/>
+              <a:gd name="connsiteX7" fmla="*/ 4571619 w 5410200"/>
+              <a:gd name="connsiteY7" fmla="*/ 0 h 18288"/>
+              <a:gd name="connsiteX8" fmla="*/ 5410200 w 5410200"/>
+              <a:gd name="connsiteY8" fmla="*/ 0 h 18288"/>
+              <a:gd name="connsiteX9" fmla="*/ 5410200 w 5410200"/>
+              <a:gd name="connsiteY9" fmla="*/ 18288 h 18288"/>
+              <a:gd name="connsiteX10" fmla="*/ 4842129 w 5410200"/>
+              <a:gd name="connsiteY10" fmla="*/ 18288 h 18288"/>
+              <a:gd name="connsiteX11" fmla="*/ 4328160 w 5410200"/>
+              <a:gd name="connsiteY11" fmla="*/ 18288 h 18288"/>
+              <a:gd name="connsiteX12" fmla="*/ 3597783 w 5410200"/>
+              <a:gd name="connsiteY12" fmla="*/ 18288 h 18288"/>
+              <a:gd name="connsiteX13" fmla="*/ 3029712 w 5410200"/>
+              <a:gd name="connsiteY13" fmla="*/ 18288 h 18288"/>
+              <a:gd name="connsiteX14" fmla="*/ 2299335 w 5410200"/>
+              <a:gd name="connsiteY14" fmla="*/ 18288 h 18288"/>
+              <a:gd name="connsiteX15" fmla="*/ 1514856 w 5410200"/>
+              <a:gd name="connsiteY15" fmla="*/ 18288 h 18288"/>
+              <a:gd name="connsiteX16" fmla="*/ 892683 w 5410200"/>
+              <a:gd name="connsiteY16" fmla="*/ 18288 h 18288"/>
+              <a:gd name="connsiteX17" fmla="*/ 0 w 5410200"/>
+              <a:gd name="connsiteY17" fmla="*/ 18288 h 18288"/>
+              <a:gd name="connsiteX18" fmla="*/ 0 w 5410200"/>
+              <a:gd name="connsiteY18" fmla="*/ 0 h 18288"/>
+            </a:gdLst>
+            <a:ahLst/>
+            <a:cxnLst>
+              <a:cxn ang="0">
+                <a:pos x="connsiteX0" y="connsiteY0"/>
+              </a:cxn>
+              <a:cxn ang="0">
+                <a:pos x="connsiteX1" y="connsiteY1"/>
+              </a:cxn>
+              <a:cxn ang="0">
+                <a:pos x="connsiteX2" y="connsiteY2"/>
+              </a:cxn>
+              <a:cxn ang="0">
+                <a:pos x="connsiteX3" y="connsiteY3"/>
+              </a:cxn>
+              <a:cxn ang="0">
+                <a:pos x="connsiteX4" y="connsiteY4"/>
+              </a:cxn>
+              <a:cxn ang="0">
+                <a:pos x="connsiteX5" y="connsiteY5"/>
+              </a:cxn>
+              <a:cxn ang="0">
+                <a:pos x="connsiteX6" y="connsiteY6"/>
+              </a:cxn>
+              <a:cxn ang="0">
+                <a:pos x="connsiteX7" y="connsiteY7"/>
+              </a:cxn>
+              <a:cxn ang="0">
+                <a:pos x="connsiteX8" y="connsiteY8"/>
+              </a:cxn>
+              <a:cxn ang="0">
+                <a:pos x="connsiteX9" y="connsiteY9"/>
+              </a:cxn>
+              <a:cxn ang="0">
+                <a:pos x="connsiteX10" y="connsiteY10"/>
+              </a:cxn>
+              <a:cxn ang="0">
+                <a:pos x="connsiteX11" y="connsiteY11"/>
+              </a:cxn>
+              <a:cxn ang="0">
+                <a:pos x="connsiteX12" y="connsiteY12"/>
+              </a:cxn>
+              <a:cxn ang="0">
+                <a:pos x="connsiteX13" y="connsiteY13"/>
+              </a:cxn>
+              <a:cxn ang="0">
+                <a:pos x="connsiteX14" y="connsiteY14"/>
+              </a:cxn>
+              <a:cxn ang="0">
+                <a:pos x="connsiteX15" y="connsiteY15"/>
+              </a:cxn>
+              <a:cxn ang="0">
+                <a:pos x="connsiteX16" y="connsiteY16"/>
+              </a:cxn>
+              <a:cxn ang="0">
+                <a:pos x="connsiteX17" y="connsiteY17"/>
+              </a:cxn>
+              <a:cxn ang="0">
+                <a:pos x="connsiteX18" y="connsiteY18"/>
+              </a:cxn>
+            </a:cxnLst>
+            <a:rect l="l" t="t" r="r" b="b"/>
+            <a:pathLst>
+              <a:path w="5410200" h="18288" fill="none" extrusionOk="0">
+                <a:moveTo>
+                  <a:pt x="0" y="0"/>
+                </a:moveTo>
+                <a:cubicBezTo>
+                  <a:pt x="163050" y="-18707"/>
+                  <a:pt x="319321" y="-16364"/>
+                  <a:pt x="568071" y="0"/>
+                </a:cubicBezTo>
+                <a:cubicBezTo>
+                  <a:pt x="816821" y="16364"/>
+                  <a:pt x="1013224" y="-7268"/>
+                  <a:pt x="1298448" y="0"/>
+                </a:cubicBezTo>
+                <a:cubicBezTo>
+                  <a:pt x="1583672" y="7268"/>
+                  <a:pt x="1631711" y="-3367"/>
+                  <a:pt x="1920621" y="0"/>
+                </a:cubicBezTo>
+                <a:cubicBezTo>
+                  <a:pt x="2209531" y="3367"/>
+                  <a:pt x="2364420" y="-19184"/>
+                  <a:pt x="2488692" y="0"/>
+                </a:cubicBezTo>
+                <a:cubicBezTo>
+                  <a:pt x="2612964" y="19184"/>
+                  <a:pt x="3023298" y="-34627"/>
+                  <a:pt x="3219069" y="0"/>
+                </a:cubicBezTo>
+                <a:cubicBezTo>
+                  <a:pt x="3414840" y="34627"/>
+                  <a:pt x="3656810" y="24043"/>
+                  <a:pt x="3895344" y="0"/>
+                </a:cubicBezTo>
+                <a:cubicBezTo>
+                  <a:pt x="4133879" y="-24043"/>
+                  <a:pt x="4393984" y="-19577"/>
+                  <a:pt x="4571619" y="0"/>
+                </a:cubicBezTo>
+                <a:cubicBezTo>
+                  <a:pt x="4749255" y="19577"/>
+                  <a:pt x="5179928" y="-6281"/>
+                  <a:pt x="5410200" y="0"/>
+                </a:cubicBezTo>
+                <a:cubicBezTo>
+                  <a:pt x="5410730" y="6954"/>
+                  <a:pt x="5410934" y="12839"/>
+                  <a:pt x="5410200" y="18288"/>
+                </a:cubicBezTo>
+                <a:cubicBezTo>
+                  <a:pt x="5139060" y="6751"/>
+                  <a:pt x="5121593" y="31035"/>
+                  <a:pt x="4842129" y="18288"/>
+                </a:cubicBezTo>
+                <a:cubicBezTo>
+                  <a:pt x="4562665" y="5541"/>
+                  <a:pt x="4448273" y="9487"/>
+                  <a:pt x="4328160" y="18288"/>
+                </a:cubicBezTo>
+                <a:cubicBezTo>
+                  <a:pt x="4208047" y="27089"/>
+                  <a:pt x="3760936" y="22567"/>
+                  <a:pt x="3597783" y="18288"/>
+                </a:cubicBezTo>
+                <a:cubicBezTo>
+                  <a:pt x="3434630" y="14009"/>
+                  <a:pt x="3299718" y="33213"/>
+                  <a:pt x="3029712" y="18288"/>
+                </a:cubicBezTo>
+                <a:cubicBezTo>
+                  <a:pt x="2759706" y="3363"/>
+                  <a:pt x="2640159" y="27394"/>
+                  <a:pt x="2299335" y="18288"/>
+                </a:cubicBezTo>
+                <a:cubicBezTo>
+                  <a:pt x="1958511" y="9182"/>
+                  <a:pt x="1801186" y="28985"/>
+                  <a:pt x="1514856" y="18288"/>
+                </a:cubicBezTo>
+                <a:cubicBezTo>
+                  <a:pt x="1228526" y="7591"/>
+                  <a:pt x="1063509" y="-5305"/>
+                  <a:pt x="892683" y="18288"/>
+                </a:cubicBezTo>
+                <a:cubicBezTo>
+                  <a:pt x="721857" y="41881"/>
+                  <a:pt x="186945" y="-20897"/>
+                  <a:pt x="0" y="18288"/>
+                </a:cubicBezTo>
+                <a:cubicBezTo>
+                  <a:pt x="-570" y="9279"/>
+                  <a:pt x="132" y="5100"/>
+                  <a:pt x="0" y="0"/>
+                </a:cubicBezTo>
+                <a:close/>
+              </a:path>
+              <a:path w="5410200" h="18288" stroke="0" extrusionOk="0">
+                <a:moveTo>
+                  <a:pt x="0" y="0"/>
+                </a:moveTo>
+                <a:cubicBezTo>
+                  <a:pt x="285096" y="-4925"/>
+                  <a:pt x="376456" y="22268"/>
+                  <a:pt x="622173" y="0"/>
+                </a:cubicBezTo>
+                <a:cubicBezTo>
+                  <a:pt x="867890" y="-22268"/>
+                  <a:pt x="1031392" y="7228"/>
+                  <a:pt x="1136142" y="0"/>
+                </a:cubicBezTo>
+                <a:cubicBezTo>
+                  <a:pt x="1240892" y="-7228"/>
+                  <a:pt x="1561853" y="9877"/>
+                  <a:pt x="1920621" y="0"/>
+                </a:cubicBezTo>
+                <a:cubicBezTo>
+                  <a:pt x="2279389" y="-9877"/>
+                  <a:pt x="2367255" y="19546"/>
+                  <a:pt x="2542794" y="0"/>
+                </a:cubicBezTo>
+                <a:cubicBezTo>
+                  <a:pt x="2718333" y="-19546"/>
+                  <a:pt x="2866732" y="-22226"/>
+                  <a:pt x="3164967" y="0"/>
+                </a:cubicBezTo>
+                <a:cubicBezTo>
+                  <a:pt x="3463202" y="22226"/>
+                  <a:pt x="3568055" y="-2765"/>
+                  <a:pt x="3949446" y="0"/>
+                </a:cubicBezTo>
+                <a:cubicBezTo>
+                  <a:pt x="4330837" y="2765"/>
+                  <a:pt x="4287895" y="10557"/>
+                  <a:pt x="4517517" y="0"/>
+                </a:cubicBezTo>
+                <a:cubicBezTo>
+                  <a:pt x="4747139" y="-10557"/>
+                  <a:pt x="5149588" y="8716"/>
+                  <a:pt x="5410200" y="0"/>
+                </a:cubicBezTo>
+                <a:cubicBezTo>
+                  <a:pt x="5409517" y="5414"/>
+                  <a:pt x="5409480" y="12510"/>
+                  <a:pt x="5410200" y="18288"/>
+                </a:cubicBezTo>
+                <a:cubicBezTo>
+                  <a:pt x="5163327" y="41494"/>
+                  <a:pt x="5008749" y="10693"/>
+                  <a:pt x="4842129" y="18288"/>
+                </a:cubicBezTo>
+                <a:cubicBezTo>
+                  <a:pt x="4675509" y="25883"/>
+                  <a:pt x="4433401" y="-615"/>
+                  <a:pt x="4165854" y="18288"/>
+                </a:cubicBezTo>
+                <a:cubicBezTo>
+                  <a:pt x="3898308" y="37191"/>
+                  <a:pt x="3809032" y="-8710"/>
+                  <a:pt x="3543681" y="18288"/>
+                </a:cubicBezTo>
+                <a:cubicBezTo>
+                  <a:pt x="3278330" y="45286"/>
+                  <a:pt x="3073876" y="-15917"/>
+                  <a:pt x="2759202" y="18288"/>
+                </a:cubicBezTo>
+                <a:cubicBezTo>
+                  <a:pt x="2444528" y="52493"/>
+                  <a:pt x="2204144" y="3372"/>
+                  <a:pt x="1974723" y="18288"/>
+                </a:cubicBezTo>
+                <a:cubicBezTo>
+                  <a:pt x="1745302" y="33204"/>
+                  <a:pt x="1602335" y="31490"/>
+                  <a:pt x="1406652" y="18288"/>
+                </a:cubicBezTo>
+                <a:cubicBezTo>
+                  <a:pt x="1210969" y="5086"/>
+                  <a:pt x="923948" y="3161"/>
+                  <a:pt x="730377" y="18288"/>
+                </a:cubicBezTo>
+                <a:cubicBezTo>
+                  <a:pt x="536806" y="33415"/>
+                  <a:pt x="336496" y="-141"/>
+                  <a:pt x="0" y="18288"/>
+                </a:cubicBezTo>
+                <a:cubicBezTo>
+                  <a:pt x="-306" y="11061"/>
+                  <a:pt x="-655" y="7751"/>
+                  <a:pt x="0" y="0"/>
+                </a:cubicBezTo>
+                <a:close/>
+              </a:path>
+            </a:pathLst>
+          </a:custGeom>
+          <a:solidFill>
+            <a:schemeClr val="accent2"/>
+          </a:solidFill>
+          <a:ln w="41275" cap="rnd">
+            <a:solidFill>
+              <a:schemeClr val="accent2"/>
+            </a:solidFill>
+            <a:round/>
+            <a:extLst>
+              <a:ext uri="{C807C97D-BFC1-408E-A445-0C87EB9F89A2}">
+                <ask:lineSketchStyleProps xmlns:ask="http://schemas.microsoft.com/office/drawing/2018/sketchyshapes" sd="1219033472">
+                  <a:prstGeom prst="rect">
+                    <a:avLst/>
+                  </a:prstGeom>
+                  <ask:type>
+                    <ask:lineSketchFreehand/>
+                  </ask:type>
+                </ask:lineSketchStyleProps>
+              </a:ext>
+            </a:extLst>
+          </a:ln>
+        </p:spPr>
+        <p:style>
+          <a:lnRef idx="2">
+            <a:schemeClr val="accent1">
+              <a:shade val="50000"/>
+            </a:schemeClr>
+          </a:lnRef>
+          <a:fillRef idx="1">
+            <a:schemeClr val="accent1"/>
+          </a:fillRef>
+          <a:effectRef idx="0">
+            <a:schemeClr val="accent1"/>
+          </a:effectRef>
+          <a:fontRef idx="minor">
+            <a:schemeClr val="lt1"/>
+          </a:fontRef>
+        </p:style>
+        <p:txBody>
+          <a:bodyPr rtlCol="0" anchor="ctr"/>
+          <a:lstStyle/>
+          <a:p>
+            <a:pPr algn="ctr"/>
+            <a:endParaRPr lang="en-US"/>
+          </a:p>
+        </p:txBody>
+      </p:sp>
+      <p:pic>
+        <p:nvPicPr>
+          <p:cNvPr id="4" name="Picture 3" descr="A picture containing screenshot, colorfulness, text, rectangle&#10;&#10;Description automatically generated">
+            <a:extLst>
+              <a:ext uri="{FF2B5EF4-FFF2-40B4-BE49-F238E27FC236}">
+                <a16:creationId xmlns:a16="http://schemas.microsoft.com/office/drawing/2014/main" id="{DC119979-DB0B-EA20-45C9-5656EC9EDDB5}"/>
+              </a:ext>
+            </a:extLst>
+          </p:cNvPr>
+          <p:cNvPicPr>
+            <a:picLocks noChangeAspect="1"/>
+          </p:cNvPicPr>
+          <p:nvPr/>
+        </p:nvPicPr>
+        <p:blipFill>
+          <a:blip r:embed="rId2">
+            <a:extLst>
+              <a:ext uri="{28A0092B-C50C-407E-A947-70E740481C1C}">
+                <a14:useLocalDpi xmlns:a14="http://schemas.microsoft.com/office/drawing/2010/main" val="0"/>
+              </a:ext>
+            </a:extLst>
+          </a:blip>
+          <a:stretch>
+            <a:fillRect/>
+          </a:stretch>
+        </p:blipFill>
+        <p:spPr>
+          <a:xfrm>
+            <a:off x="292608" y="3405095"/>
+            <a:ext cx="3758184" cy="2029419"/>
+          </a:xfrm>
+          <a:prstGeom prst="rect">
+            <a:avLst/>
+          </a:prstGeom>
+        </p:spPr>
+      </p:pic>
+      <p:pic>
+        <p:nvPicPr>
+          <p:cNvPr id="6" name="Picture 5" descr="A picture containing screenshot, text, colorfulness, rectangle&#10;&#10;Description automatically generated">
+            <a:extLst>
+              <a:ext uri="{FF2B5EF4-FFF2-40B4-BE49-F238E27FC236}">
+                <a16:creationId xmlns:a16="http://schemas.microsoft.com/office/drawing/2014/main" id="{152D5B02-A11D-E9E5-F04A-9A2DB4FD4EDD}"/>
+              </a:ext>
+            </a:extLst>
+          </p:cNvPr>
+          <p:cNvPicPr>
+            <a:picLocks noChangeAspect="1"/>
+          </p:cNvPicPr>
+          <p:nvPr/>
+        </p:nvPicPr>
+        <p:blipFill>
+          <a:blip r:embed="rId3">
+            <a:extLst>
+              <a:ext uri="{28A0092B-C50C-407E-A947-70E740481C1C}">
+                <a14:useLocalDpi xmlns:a14="http://schemas.microsoft.com/office/drawing/2010/main" val="0"/>
+              </a:ext>
+            </a:extLst>
+          </a:blip>
+          <a:stretch>
+            <a:fillRect/>
+          </a:stretch>
+        </p:blipFill>
+        <p:spPr>
+          <a:xfrm>
+            <a:off x="4216908" y="3405095"/>
+            <a:ext cx="3758184" cy="2029419"/>
+          </a:xfrm>
+          <a:prstGeom prst="rect">
+            <a:avLst/>
+          </a:prstGeom>
+        </p:spPr>
+      </p:pic>
+      <p:pic>
+        <p:nvPicPr>
+          <p:cNvPr id="8" name="Picture 7" descr="A picture containing screenshot, text, colorfulness, rectangle&#10;&#10;Description automatically generated">
+            <a:extLst>
+              <a:ext uri="{FF2B5EF4-FFF2-40B4-BE49-F238E27FC236}">
+                <a16:creationId xmlns:a16="http://schemas.microsoft.com/office/drawing/2014/main" id="{212E88AA-DCD8-5947-D7DD-C715493C559E}"/>
+              </a:ext>
+            </a:extLst>
+          </p:cNvPr>
+          <p:cNvPicPr>
+            <a:picLocks noChangeAspect="1"/>
+          </p:cNvPicPr>
+          <p:nvPr/>
+        </p:nvPicPr>
+        <p:blipFill>
+          <a:blip r:embed="rId4">
+            <a:extLst>
+              <a:ext uri="{28A0092B-C50C-407E-A947-70E740481C1C}">
+                <a14:useLocalDpi xmlns:a14="http://schemas.microsoft.com/office/drawing/2010/main" val="0"/>
+              </a:ext>
+            </a:extLst>
+          </a:blip>
+          <a:stretch>
+            <a:fillRect/>
+          </a:stretch>
+        </p:blipFill>
+        <p:spPr>
+          <a:xfrm>
+            <a:off x="8141208" y="3405095"/>
+            <a:ext cx="3758184" cy="2029419"/>
+          </a:xfrm>
+          <a:prstGeom prst="rect">
+            <a:avLst/>
+          </a:prstGeom>
+        </p:spPr>
+      </p:pic>
     </p:spTree>
     <p:extLst>
       <p:ext uri="{BB962C8B-B14F-4D97-AF65-F5344CB8AC3E}">
         <p14:creationId xmlns:p14="http://schemas.microsoft.com/office/powerpoint/2010/main" val="3947589887"/>
+      </p:ext>
+    </p:extLst>
+  </p:cSld>
+  <p:clrMapOvr>
+    <a:masterClrMapping/>
+  </p:clrMapOvr>
+</p:sld>
+</file>
+
+<file path=ppt/slides/slide11.xml><?xml version="1.0" encoding="utf-8"?>
+<p:sld xmlns:a="http://schemas.openxmlformats.org/drawingml/2006/main" xmlns:r="http://schemas.openxmlformats.org/officeDocument/2006/relationships" xmlns:p="http://schemas.openxmlformats.org/presentationml/2006/main">
+  <p:cSld>
+    <p:bg>
+      <p:bgPr>
+        <a:solidFill>
+          <a:schemeClr val="bg1"/>
+        </a:solidFill>
+        <a:effectLst/>
+      </p:bgPr>
+    </p:bg>
+    <p:spTree>
+      <p:nvGrpSpPr>
+        <p:cNvPr id="1" name=""/>
+        <p:cNvGrpSpPr/>
+        <p:nvPr/>
+      </p:nvGrpSpPr>
+      <p:grpSpPr>
+        <a:xfrm>
+          <a:off x="0" y="0"/>
+          <a:ext cx="0" cy="0"/>
+          <a:chOff x="0" y="0"/>
+          <a:chExt cx="0" cy="0"/>
+        </a:xfrm>
+      </p:grpSpPr>
+      <p:sp useBgFill="1">
+        <p:nvSpPr>
+          <p:cNvPr id="13" name="Rectangle 12">
+            <a:extLst>
+              <a:ext uri="{FF2B5EF4-FFF2-40B4-BE49-F238E27FC236}">
+                <a16:creationId xmlns:a16="http://schemas.microsoft.com/office/drawing/2014/main" id="{7C98A213-5994-475E-B327-DC6EC27FBA8B}"/>
+              </a:ext>
+              <a:ext uri="{C183D7F6-B498-43B3-948B-1728B52AA6E4}">
+                <adec:decorative xmlns:adec="http://schemas.microsoft.com/office/drawing/2017/decorative" val="1"/>
+              </a:ext>
+            </a:extLst>
+          </p:cNvPr>
+          <p:cNvSpPr>
+            <a:spLocks noGrp="1" noRot="1" noChangeAspect="1" noMove="1" noResize="1" noEditPoints="1" noAdjustHandles="1" noChangeArrowheads="1" noChangeShapeType="1" noTextEdit="1"/>
+          </p:cNvSpPr>
+          <p:nvPr>
+            <p:extLst>
+              <p:ext uri="{386F3935-93C4-4BCD-93E2-E3B085C9AB24}">
+                <p16:designElem xmlns:p16="http://schemas.microsoft.com/office/powerpoint/2015/main" val="1"/>
+              </p:ext>
+            </p:extLst>
+          </p:nvPr>
+        </p:nvSpPr>
+        <p:spPr>
+          <a:xfrm>
+            <a:off x="0" y="0"/>
+            <a:ext cx="12188952" cy="6858000"/>
+          </a:xfrm>
+          <a:prstGeom prst="rect">
+            <a:avLst/>
+          </a:prstGeom>
+          <a:ln>
+            <a:noFill/>
+          </a:ln>
+        </p:spPr>
+        <p:style>
+          <a:lnRef idx="2">
+            <a:schemeClr val="accent1">
+              <a:shade val="50000"/>
+            </a:schemeClr>
+          </a:lnRef>
+          <a:fillRef idx="1">
+            <a:schemeClr val="accent1"/>
+          </a:fillRef>
+          <a:effectRef idx="0">
+            <a:schemeClr val="accent1"/>
+          </a:effectRef>
+          <a:fontRef idx="minor">
+            <a:schemeClr val="lt1"/>
+          </a:fontRef>
+        </p:style>
+        <p:txBody>
+          <a:bodyPr rtlCol="0" anchor="ctr"/>
+          <a:lstStyle/>
+          <a:p>
+            <a:pPr algn="ctr"/>
+            <a:endParaRPr lang="en-US"/>
+          </a:p>
+        </p:txBody>
+      </p:sp>
+      <p:sp>
+        <p:nvSpPr>
+          <p:cNvPr id="2" name="Title 1">
+            <a:extLst>
+              <a:ext uri="{FF2B5EF4-FFF2-40B4-BE49-F238E27FC236}">
+                <a16:creationId xmlns:a16="http://schemas.microsoft.com/office/drawing/2014/main" id="{573EB259-1CE0-0154-C9B6-ACC5225428AC}"/>
+              </a:ext>
+            </a:extLst>
+          </p:cNvPr>
+          <p:cNvSpPr>
+            <a:spLocks noGrp="1"/>
+          </p:cNvSpPr>
+          <p:nvPr>
+            <p:ph type="title"/>
+          </p:nvPr>
+        </p:nvSpPr>
+        <p:spPr>
+          <a:xfrm>
+            <a:off x="638881" y="670218"/>
+            <a:ext cx="10909640" cy="1065836"/>
+          </a:xfrm>
+        </p:spPr>
+        <p:txBody>
+          <a:bodyPr vert="horz" lIns="91440" tIns="45720" rIns="91440" bIns="45720" rtlCol="0" anchor="ctr">
+            <a:normAutofit/>
+          </a:bodyPr>
+          <a:lstStyle/>
+          <a:p>
+            <a:pPr algn="ctr"/>
+            <a:r>
+              <a:rPr lang="en-US" sz="6600" dirty="0">
+                <a:latin typeface="Lexend"/>
+              </a:rPr>
+              <a:t>Support Vector Machine</a:t>
+            </a:r>
+          </a:p>
+        </p:txBody>
+      </p:sp>
+      <p:sp>
+        <p:nvSpPr>
+          <p:cNvPr id="15" name="sketch line">
+            <a:extLst>
+              <a:ext uri="{FF2B5EF4-FFF2-40B4-BE49-F238E27FC236}">
+                <a16:creationId xmlns:a16="http://schemas.microsoft.com/office/drawing/2014/main" id="{4B030A0D-0DAD-4A99-89BB-419527D6A64B}"/>
+              </a:ext>
+              <a:ext uri="{C183D7F6-B498-43B3-948B-1728B52AA6E4}">
+                <adec:decorative xmlns:adec="http://schemas.microsoft.com/office/drawing/2017/decorative" val="1"/>
+              </a:ext>
+            </a:extLst>
+          </p:cNvPr>
+          <p:cNvSpPr>
+            <a:spLocks noGrp="1" noRot="1" noChangeAspect="1" noMove="1" noResize="1" noEditPoints="1" noAdjustHandles="1" noChangeArrowheads="1" noChangeShapeType="1" noTextEdit="1"/>
+          </p:cNvSpPr>
+          <p:nvPr>
+            <p:extLst>
+              <p:ext uri="{386F3935-93C4-4BCD-93E2-E3B085C9AB24}">
+                <p16:designElem xmlns:p16="http://schemas.microsoft.com/office/powerpoint/2015/main" val="1"/>
+              </p:ext>
+            </p:extLst>
+          </p:nvPr>
+        </p:nvSpPr>
+        <p:spPr>
+          <a:xfrm>
+            <a:off x="3389376" y="1800088"/>
+            <a:ext cx="5410200" cy="18288"/>
+          </a:xfrm>
+          <a:custGeom>
+            <a:avLst/>
+            <a:gdLst>
+              <a:gd name="connsiteX0" fmla="*/ 0 w 5410200"/>
+              <a:gd name="connsiteY0" fmla="*/ 0 h 18288"/>
+              <a:gd name="connsiteX1" fmla="*/ 568071 w 5410200"/>
+              <a:gd name="connsiteY1" fmla="*/ 0 h 18288"/>
+              <a:gd name="connsiteX2" fmla="*/ 1298448 w 5410200"/>
+              <a:gd name="connsiteY2" fmla="*/ 0 h 18288"/>
+              <a:gd name="connsiteX3" fmla="*/ 1920621 w 5410200"/>
+              <a:gd name="connsiteY3" fmla="*/ 0 h 18288"/>
+              <a:gd name="connsiteX4" fmla="*/ 2488692 w 5410200"/>
+              <a:gd name="connsiteY4" fmla="*/ 0 h 18288"/>
+              <a:gd name="connsiteX5" fmla="*/ 3219069 w 5410200"/>
+              <a:gd name="connsiteY5" fmla="*/ 0 h 18288"/>
+              <a:gd name="connsiteX6" fmla="*/ 3895344 w 5410200"/>
+              <a:gd name="connsiteY6" fmla="*/ 0 h 18288"/>
+              <a:gd name="connsiteX7" fmla="*/ 4571619 w 5410200"/>
+              <a:gd name="connsiteY7" fmla="*/ 0 h 18288"/>
+              <a:gd name="connsiteX8" fmla="*/ 5410200 w 5410200"/>
+              <a:gd name="connsiteY8" fmla="*/ 0 h 18288"/>
+              <a:gd name="connsiteX9" fmla="*/ 5410200 w 5410200"/>
+              <a:gd name="connsiteY9" fmla="*/ 18288 h 18288"/>
+              <a:gd name="connsiteX10" fmla="*/ 4842129 w 5410200"/>
+              <a:gd name="connsiteY10" fmla="*/ 18288 h 18288"/>
+              <a:gd name="connsiteX11" fmla="*/ 4328160 w 5410200"/>
+              <a:gd name="connsiteY11" fmla="*/ 18288 h 18288"/>
+              <a:gd name="connsiteX12" fmla="*/ 3597783 w 5410200"/>
+              <a:gd name="connsiteY12" fmla="*/ 18288 h 18288"/>
+              <a:gd name="connsiteX13" fmla="*/ 3029712 w 5410200"/>
+              <a:gd name="connsiteY13" fmla="*/ 18288 h 18288"/>
+              <a:gd name="connsiteX14" fmla="*/ 2299335 w 5410200"/>
+              <a:gd name="connsiteY14" fmla="*/ 18288 h 18288"/>
+              <a:gd name="connsiteX15" fmla="*/ 1514856 w 5410200"/>
+              <a:gd name="connsiteY15" fmla="*/ 18288 h 18288"/>
+              <a:gd name="connsiteX16" fmla="*/ 892683 w 5410200"/>
+              <a:gd name="connsiteY16" fmla="*/ 18288 h 18288"/>
+              <a:gd name="connsiteX17" fmla="*/ 0 w 5410200"/>
+              <a:gd name="connsiteY17" fmla="*/ 18288 h 18288"/>
+              <a:gd name="connsiteX18" fmla="*/ 0 w 5410200"/>
+              <a:gd name="connsiteY18" fmla="*/ 0 h 18288"/>
+            </a:gdLst>
+            <a:ahLst/>
+            <a:cxnLst>
+              <a:cxn ang="0">
+                <a:pos x="connsiteX0" y="connsiteY0"/>
+              </a:cxn>
+              <a:cxn ang="0">
+                <a:pos x="connsiteX1" y="connsiteY1"/>
+              </a:cxn>
+              <a:cxn ang="0">
+                <a:pos x="connsiteX2" y="connsiteY2"/>
+              </a:cxn>
+              <a:cxn ang="0">
+                <a:pos x="connsiteX3" y="connsiteY3"/>
+              </a:cxn>
+              <a:cxn ang="0">
+                <a:pos x="connsiteX4" y="connsiteY4"/>
+              </a:cxn>
+              <a:cxn ang="0">
+                <a:pos x="connsiteX5" y="connsiteY5"/>
+              </a:cxn>
+              <a:cxn ang="0">
+                <a:pos x="connsiteX6" y="connsiteY6"/>
+              </a:cxn>
+              <a:cxn ang="0">
+                <a:pos x="connsiteX7" y="connsiteY7"/>
+              </a:cxn>
+              <a:cxn ang="0">
+                <a:pos x="connsiteX8" y="connsiteY8"/>
+              </a:cxn>
+              <a:cxn ang="0">
+                <a:pos x="connsiteX9" y="connsiteY9"/>
+              </a:cxn>
+              <a:cxn ang="0">
+                <a:pos x="connsiteX10" y="connsiteY10"/>
+              </a:cxn>
+              <a:cxn ang="0">
+                <a:pos x="connsiteX11" y="connsiteY11"/>
+              </a:cxn>
+              <a:cxn ang="0">
+                <a:pos x="connsiteX12" y="connsiteY12"/>
+              </a:cxn>
+              <a:cxn ang="0">
+                <a:pos x="connsiteX13" y="connsiteY13"/>
+              </a:cxn>
+              <a:cxn ang="0">
+                <a:pos x="connsiteX14" y="connsiteY14"/>
+              </a:cxn>
+              <a:cxn ang="0">
+                <a:pos x="connsiteX15" y="connsiteY15"/>
+              </a:cxn>
+              <a:cxn ang="0">
+                <a:pos x="connsiteX16" y="connsiteY16"/>
+              </a:cxn>
+              <a:cxn ang="0">
+                <a:pos x="connsiteX17" y="connsiteY17"/>
+              </a:cxn>
+              <a:cxn ang="0">
+                <a:pos x="connsiteX18" y="connsiteY18"/>
+              </a:cxn>
+            </a:cxnLst>
+            <a:rect l="l" t="t" r="r" b="b"/>
+            <a:pathLst>
+              <a:path w="5410200" h="18288" fill="none" extrusionOk="0">
+                <a:moveTo>
+                  <a:pt x="0" y="0"/>
+                </a:moveTo>
+                <a:cubicBezTo>
+                  <a:pt x="163050" y="-18707"/>
+                  <a:pt x="319321" y="-16364"/>
+                  <a:pt x="568071" y="0"/>
+                </a:cubicBezTo>
+                <a:cubicBezTo>
+                  <a:pt x="816821" y="16364"/>
+                  <a:pt x="1013224" y="-7268"/>
+                  <a:pt x="1298448" y="0"/>
+                </a:cubicBezTo>
+                <a:cubicBezTo>
+                  <a:pt x="1583672" y="7268"/>
+                  <a:pt x="1631711" y="-3367"/>
+                  <a:pt x="1920621" y="0"/>
+                </a:cubicBezTo>
+                <a:cubicBezTo>
+                  <a:pt x="2209531" y="3367"/>
+                  <a:pt x="2364420" y="-19184"/>
+                  <a:pt x="2488692" y="0"/>
+                </a:cubicBezTo>
+                <a:cubicBezTo>
+                  <a:pt x="2612964" y="19184"/>
+                  <a:pt x="3023298" y="-34627"/>
+                  <a:pt x="3219069" y="0"/>
+                </a:cubicBezTo>
+                <a:cubicBezTo>
+                  <a:pt x="3414840" y="34627"/>
+                  <a:pt x="3656810" y="24043"/>
+                  <a:pt x="3895344" y="0"/>
+                </a:cubicBezTo>
+                <a:cubicBezTo>
+                  <a:pt x="4133879" y="-24043"/>
+                  <a:pt x="4393984" y="-19577"/>
+                  <a:pt x="4571619" y="0"/>
+                </a:cubicBezTo>
+                <a:cubicBezTo>
+                  <a:pt x="4749255" y="19577"/>
+                  <a:pt x="5179928" y="-6281"/>
+                  <a:pt x="5410200" y="0"/>
+                </a:cubicBezTo>
+                <a:cubicBezTo>
+                  <a:pt x="5410730" y="6954"/>
+                  <a:pt x="5410934" y="12839"/>
+                  <a:pt x="5410200" y="18288"/>
+                </a:cubicBezTo>
+                <a:cubicBezTo>
+                  <a:pt x="5139060" y="6751"/>
+                  <a:pt x="5121593" y="31035"/>
+                  <a:pt x="4842129" y="18288"/>
+                </a:cubicBezTo>
+                <a:cubicBezTo>
+                  <a:pt x="4562665" y="5541"/>
+                  <a:pt x="4448273" y="9487"/>
+                  <a:pt x="4328160" y="18288"/>
+                </a:cubicBezTo>
+                <a:cubicBezTo>
+                  <a:pt x="4208047" y="27089"/>
+                  <a:pt x="3760936" y="22567"/>
+                  <a:pt x="3597783" y="18288"/>
+                </a:cubicBezTo>
+                <a:cubicBezTo>
+                  <a:pt x="3434630" y="14009"/>
+                  <a:pt x="3299718" y="33213"/>
+                  <a:pt x="3029712" y="18288"/>
+                </a:cubicBezTo>
+                <a:cubicBezTo>
+                  <a:pt x="2759706" y="3363"/>
+                  <a:pt x="2640159" y="27394"/>
+                  <a:pt x="2299335" y="18288"/>
+                </a:cubicBezTo>
+                <a:cubicBezTo>
+                  <a:pt x="1958511" y="9182"/>
+                  <a:pt x="1801186" y="28985"/>
+                  <a:pt x="1514856" y="18288"/>
+                </a:cubicBezTo>
+                <a:cubicBezTo>
+                  <a:pt x="1228526" y="7591"/>
+                  <a:pt x="1063509" y="-5305"/>
+                  <a:pt x="892683" y="18288"/>
+                </a:cubicBezTo>
+                <a:cubicBezTo>
+                  <a:pt x="721857" y="41881"/>
+                  <a:pt x="186945" y="-20897"/>
+                  <a:pt x="0" y="18288"/>
+                </a:cubicBezTo>
+                <a:cubicBezTo>
+                  <a:pt x="-570" y="9279"/>
+                  <a:pt x="132" y="5100"/>
+                  <a:pt x="0" y="0"/>
+                </a:cubicBezTo>
+                <a:close/>
+              </a:path>
+              <a:path w="5410200" h="18288" stroke="0" extrusionOk="0">
+                <a:moveTo>
+                  <a:pt x="0" y="0"/>
+                </a:moveTo>
+                <a:cubicBezTo>
+                  <a:pt x="285096" y="-4925"/>
+                  <a:pt x="376456" y="22268"/>
+                  <a:pt x="622173" y="0"/>
+                </a:cubicBezTo>
+                <a:cubicBezTo>
+                  <a:pt x="867890" y="-22268"/>
+                  <a:pt x="1031392" y="7228"/>
+                  <a:pt x="1136142" y="0"/>
+                </a:cubicBezTo>
+                <a:cubicBezTo>
+                  <a:pt x="1240892" y="-7228"/>
+                  <a:pt x="1561853" y="9877"/>
+                  <a:pt x="1920621" y="0"/>
+                </a:cubicBezTo>
+                <a:cubicBezTo>
+                  <a:pt x="2279389" y="-9877"/>
+                  <a:pt x="2367255" y="19546"/>
+                  <a:pt x="2542794" y="0"/>
+                </a:cubicBezTo>
+                <a:cubicBezTo>
+                  <a:pt x="2718333" y="-19546"/>
+                  <a:pt x="2866732" y="-22226"/>
+                  <a:pt x="3164967" y="0"/>
+                </a:cubicBezTo>
+                <a:cubicBezTo>
+                  <a:pt x="3463202" y="22226"/>
+                  <a:pt x="3568055" y="-2765"/>
+                  <a:pt x="3949446" y="0"/>
+                </a:cubicBezTo>
+                <a:cubicBezTo>
+                  <a:pt x="4330837" y="2765"/>
+                  <a:pt x="4287895" y="10557"/>
+                  <a:pt x="4517517" y="0"/>
+                </a:cubicBezTo>
+                <a:cubicBezTo>
+                  <a:pt x="4747139" y="-10557"/>
+                  <a:pt x="5149588" y="8716"/>
+                  <a:pt x="5410200" y="0"/>
+                </a:cubicBezTo>
+                <a:cubicBezTo>
+                  <a:pt x="5409517" y="5414"/>
+                  <a:pt x="5409480" y="12510"/>
+                  <a:pt x="5410200" y="18288"/>
+                </a:cubicBezTo>
+                <a:cubicBezTo>
+                  <a:pt x="5163327" y="41494"/>
+                  <a:pt x="5008749" y="10693"/>
+                  <a:pt x="4842129" y="18288"/>
+                </a:cubicBezTo>
+                <a:cubicBezTo>
+                  <a:pt x="4675509" y="25883"/>
+                  <a:pt x="4433401" y="-615"/>
+                  <a:pt x="4165854" y="18288"/>
+                </a:cubicBezTo>
+                <a:cubicBezTo>
+                  <a:pt x="3898308" y="37191"/>
+                  <a:pt x="3809032" y="-8710"/>
+                  <a:pt x="3543681" y="18288"/>
+                </a:cubicBezTo>
+                <a:cubicBezTo>
+                  <a:pt x="3278330" y="45286"/>
+                  <a:pt x="3073876" y="-15917"/>
+                  <a:pt x="2759202" y="18288"/>
+                </a:cubicBezTo>
+                <a:cubicBezTo>
+                  <a:pt x="2444528" y="52493"/>
+                  <a:pt x="2204144" y="3372"/>
+                  <a:pt x="1974723" y="18288"/>
+                </a:cubicBezTo>
+                <a:cubicBezTo>
+                  <a:pt x="1745302" y="33204"/>
+                  <a:pt x="1602335" y="31490"/>
+                  <a:pt x="1406652" y="18288"/>
+                </a:cubicBezTo>
+                <a:cubicBezTo>
+                  <a:pt x="1210969" y="5086"/>
+                  <a:pt x="923948" y="3161"/>
+                  <a:pt x="730377" y="18288"/>
+                </a:cubicBezTo>
+                <a:cubicBezTo>
+                  <a:pt x="536806" y="33415"/>
+                  <a:pt x="336496" y="-141"/>
+                  <a:pt x="0" y="18288"/>
+                </a:cubicBezTo>
+                <a:cubicBezTo>
+                  <a:pt x="-306" y="11061"/>
+                  <a:pt x="-655" y="7751"/>
+                  <a:pt x="0" y="0"/>
+                </a:cubicBezTo>
+                <a:close/>
+              </a:path>
+            </a:pathLst>
+          </a:custGeom>
+          <a:solidFill>
+            <a:schemeClr val="accent2"/>
+          </a:solidFill>
+          <a:ln w="41275" cap="rnd">
+            <a:solidFill>
+              <a:schemeClr val="accent2"/>
+            </a:solidFill>
+            <a:round/>
+            <a:extLst>
+              <a:ext uri="{C807C97D-BFC1-408E-A445-0C87EB9F89A2}">
+                <ask:lineSketchStyleProps xmlns:ask="http://schemas.microsoft.com/office/drawing/2018/sketchyshapes" sd="1219033472">
+                  <a:prstGeom prst="rect">
+                    <a:avLst/>
+                  </a:prstGeom>
+                  <ask:type>
+                    <ask:lineSketchFreehand/>
+                  </ask:type>
+                </ask:lineSketchStyleProps>
+              </a:ext>
+            </a:extLst>
+          </a:ln>
+        </p:spPr>
+        <p:style>
+          <a:lnRef idx="2">
+            <a:schemeClr val="accent1">
+              <a:shade val="50000"/>
+            </a:schemeClr>
+          </a:lnRef>
+          <a:fillRef idx="1">
+            <a:schemeClr val="accent1"/>
+          </a:fillRef>
+          <a:effectRef idx="0">
+            <a:schemeClr val="accent1"/>
+          </a:effectRef>
+          <a:fontRef idx="minor">
+            <a:schemeClr val="lt1"/>
+          </a:fontRef>
+        </p:style>
+        <p:txBody>
+          <a:bodyPr rtlCol="0" anchor="ctr"/>
+          <a:lstStyle/>
+          <a:p>
+            <a:pPr algn="ctr"/>
+            <a:endParaRPr lang="en-US"/>
+          </a:p>
+        </p:txBody>
+      </p:sp>
+      <p:pic>
+        <p:nvPicPr>
+          <p:cNvPr id="8" name="Picture 7" descr="A picture containing text, screenshot, rectangle, design&#10;&#10;Description automatically generated">
+            <a:extLst>
+              <a:ext uri="{FF2B5EF4-FFF2-40B4-BE49-F238E27FC236}">
+                <a16:creationId xmlns:a16="http://schemas.microsoft.com/office/drawing/2014/main" id="{C0B38130-4F49-23F7-1A47-57D6C51182A5}"/>
+              </a:ext>
+            </a:extLst>
+          </p:cNvPr>
+          <p:cNvPicPr>
+            <a:picLocks noChangeAspect="1"/>
+          </p:cNvPicPr>
+          <p:nvPr/>
+        </p:nvPicPr>
+        <p:blipFill>
+          <a:blip r:embed="rId2">
+            <a:extLst>
+              <a:ext uri="{28A0092B-C50C-407E-A947-70E740481C1C}">
+                <a14:useLocalDpi xmlns:a14="http://schemas.microsoft.com/office/drawing/2010/main" val="0"/>
+              </a:ext>
+            </a:extLst>
+          </a:blip>
+          <a:stretch>
+            <a:fillRect/>
+          </a:stretch>
+        </p:blipFill>
+        <p:spPr>
+          <a:xfrm>
+            <a:off x="292608" y="3405095"/>
+            <a:ext cx="3758184" cy="2029419"/>
+          </a:xfrm>
+          <a:prstGeom prst="rect">
+            <a:avLst/>
+          </a:prstGeom>
+        </p:spPr>
+      </p:pic>
+      <p:pic>
+        <p:nvPicPr>
+          <p:cNvPr id="6" name="Picture 5" descr="A screenshot of a graph&#10;&#10;Description automatically generated with low confidence">
+            <a:extLst>
+              <a:ext uri="{FF2B5EF4-FFF2-40B4-BE49-F238E27FC236}">
+                <a16:creationId xmlns:a16="http://schemas.microsoft.com/office/drawing/2014/main" id="{985BF78F-B743-9138-45B5-888EBF307F43}"/>
+              </a:ext>
+            </a:extLst>
+          </p:cNvPr>
+          <p:cNvPicPr>
+            <a:picLocks noChangeAspect="1"/>
+          </p:cNvPicPr>
+          <p:nvPr/>
+        </p:nvPicPr>
+        <p:blipFill>
+          <a:blip r:embed="rId3">
+            <a:extLst>
+              <a:ext uri="{28A0092B-C50C-407E-A947-70E740481C1C}">
+                <a14:useLocalDpi xmlns:a14="http://schemas.microsoft.com/office/drawing/2010/main" val="0"/>
+              </a:ext>
+            </a:extLst>
+          </a:blip>
+          <a:stretch>
+            <a:fillRect/>
+          </a:stretch>
+        </p:blipFill>
+        <p:spPr>
+          <a:xfrm>
+            <a:off x="4216908" y="3405095"/>
+            <a:ext cx="3758184" cy="2029419"/>
+          </a:xfrm>
+          <a:prstGeom prst="rect">
+            <a:avLst/>
+          </a:prstGeom>
+        </p:spPr>
+      </p:pic>
+      <p:pic>
+        <p:nvPicPr>
+          <p:cNvPr id="4" name="Picture 3" descr="A picture containing text, screenshot, rectangle&#10;&#10;Description automatically generated">
+            <a:extLst>
+              <a:ext uri="{FF2B5EF4-FFF2-40B4-BE49-F238E27FC236}">
+                <a16:creationId xmlns:a16="http://schemas.microsoft.com/office/drawing/2014/main" id="{93B27E4D-73F8-6CED-87CA-D62E834371BF}"/>
+              </a:ext>
+            </a:extLst>
+          </p:cNvPr>
+          <p:cNvPicPr>
+            <a:picLocks noChangeAspect="1"/>
+          </p:cNvPicPr>
+          <p:nvPr/>
+        </p:nvPicPr>
+        <p:blipFill>
+          <a:blip r:embed="rId4">
+            <a:extLst>
+              <a:ext uri="{28A0092B-C50C-407E-A947-70E740481C1C}">
+                <a14:useLocalDpi xmlns:a14="http://schemas.microsoft.com/office/drawing/2010/main" val="0"/>
+              </a:ext>
+            </a:extLst>
+          </a:blip>
+          <a:stretch>
+            <a:fillRect/>
+          </a:stretch>
+        </p:blipFill>
+        <p:spPr>
+          <a:xfrm>
+            <a:off x="8141208" y="3405095"/>
+            <a:ext cx="3758184" cy="2029419"/>
+          </a:xfrm>
+          <a:prstGeom prst="rect">
+            <a:avLst/>
+          </a:prstGeom>
+        </p:spPr>
+      </p:pic>
+    </p:spTree>
+    <p:extLst>
+      <p:ext uri="{BB962C8B-B14F-4D97-AF65-F5344CB8AC3E}">
+        <p14:creationId xmlns:p14="http://schemas.microsoft.com/office/powerpoint/2010/main" val="1481736657"/>
+      </p:ext>
+    </p:extLst>
+  </p:cSld>
+  <p:clrMapOvr>
+    <a:masterClrMapping/>
+  </p:clrMapOvr>
+</p:sld>
+</file>
+
+<file path=ppt/slides/slide12.xml><?xml version="1.0" encoding="utf-8"?>
+<p:sld xmlns:a="http://schemas.openxmlformats.org/drawingml/2006/main" xmlns:r="http://schemas.openxmlformats.org/officeDocument/2006/relationships" xmlns:p="http://schemas.openxmlformats.org/presentationml/2006/main">
+  <p:cSld>
+    <p:bg>
+      <p:bgPr>
+        <a:solidFill>
+          <a:schemeClr val="bg1"/>
+        </a:solidFill>
+        <a:effectLst/>
+      </p:bgPr>
+    </p:bg>
+    <p:spTree>
+      <p:nvGrpSpPr>
+        <p:cNvPr id="1" name=""/>
+        <p:cNvGrpSpPr/>
+        <p:nvPr/>
+      </p:nvGrpSpPr>
+      <p:grpSpPr>
+        <a:xfrm>
+          <a:off x="0" y="0"/>
+          <a:ext cx="0" cy="0"/>
+          <a:chOff x="0" y="0"/>
+          <a:chExt cx="0" cy="0"/>
+        </a:xfrm>
+      </p:grpSpPr>
+      <p:sp useBgFill="1">
+        <p:nvSpPr>
+          <p:cNvPr id="13" name="Rectangle 12">
+            <a:extLst>
+              <a:ext uri="{FF2B5EF4-FFF2-40B4-BE49-F238E27FC236}">
+                <a16:creationId xmlns:a16="http://schemas.microsoft.com/office/drawing/2014/main" id="{7C98A213-5994-475E-B327-DC6EC27FBA8B}"/>
+              </a:ext>
+              <a:ext uri="{C183D7F6-B498-43B3-948B-1728B52AA6E4}">
+                <adec:decorative xmlns:adec="http://schemas.microsoft.com/office/drawing/2017/decorative" val="1"/>
+              </a:ext>
+            </a:extLst>
+          </p:cNvPr>
+          <p:cNvSpPr>
+            <a:spLocks noGrp="1" noRot="1" noChangeAspect="1" noMove="1" noResize="1" noEditPoints="1" noAdjustHandles="1" noChangeArrowheads="1" noChangeShapeType="1" noTextEdit="1"/>
+          </p:cNvSpPr>
+          <p:nvPr>
+            <p:extLst>
+              <p:ext uri="{386F3935-93C4-4BCD-93E2-E3B085C9AB24}">
+                <p16:designElem xmlns:p16="http://schemas.microsoft.com/office/powerpoint/2015/main" val="1"/>
+              </p:ext>
+            </p:extLst>
+          </p:nvPr>
+        </p:nvSpPr>
+        <p:spPr>
+          <a:xfrm>
+            <a:off x="0" y="0"/>
+            <a:ext cx="12188952" cy="6858000"/>
+          </a:xfrm>
+          <a:prstGeom prst="rect">
+            <a:avLst/>
+          </a:prstGeom>
+          <a:ln>
+            <a:noFill/>
+          </a:ln>
+        </p:spPr>
+        <p:style>
+          <a:lnRef idx="2">
+            <a:schemeClr val="accent1">
+              <a:shade val="50000"/>
+            </a:schemeClr>
+          </a:lnRef>
+          <a:fillRef idx="1">
+            <a:schemeClr val="accent1"/>
+          </a:fillRef>
+          <a:effectRef idx="0">
+            <a:schemeClr val="accent1"/>
+          </a:effectRef>
+          <a:fontRef idx="minor">
+            <a:schemeClr val="lt1"/>
+          </a:fontRef>
+        </p:style>
+        <p:txBody>
+          <a:bodyPr rtlCol="0" anchor="ctr"/>
+          <a:lstStyle/>
+          <a:p>
+            <a:pPr algn="ctr"/>
+            <a:endParaRPr lang="en-US"/>
+          </a:p>
+        </p:txBody>
+      </p:sp>
+      <p:sp>
+        <p:nvSpPr>
+          <p:cNvPr id="2" name="Title 1">
+            <a:extLst>
+              <a:ext uri="{FF2B5EF4-FFF2-40B4-BE49-F238E27FC236}">
+                <a16:creationId xmlns:a16="http://schemas.microsoft.com/office/drawing/2014/main" id="{8F508B53-717B-9102-6081-9C8B6D3759D0}"/>
+              </a:ext>
+            </a:extLst>
+          </p:cNvPr>
+          <p:cNvSpPr>
+            <a:spLocks noGrp="1"/>
+          </p:cNvSpPr>
+          <p:nvPr>
+            <p:ph type="title"/>
+          </p:nvPr>
+        </p:nvSpPr>
+        <p:spPr>
+          <a:xfrm>
+            <a:off x="638881" y="670218"/>
+            <a:ext cx="10909640" cy="1065836"/>
+          </a:xfrm>
+        </p:spPr>
+        <p:txBody>
+          <a:bodyPr vert="horz" lIns="91440" tIns="45720" rIns="91440" bIns="45720" rtlCol="0" anchor="ctr">
+            <a:normAutofit/>
+          </a:bodyPr>
+          <a:lstStyle/>
+          <a:p>
+            <a:pPr algn="ctr"/>
+            <a:r>
+              <a:rPr lang="en-US" sz="6600" dirty="0">
+                <a:latin typeface="Lexend"/>
+              </a:rPr>
+              <a:t>Stochastic Gradient Descent</a:t>
+            </a:r>
+          </a:p>
+        </p:txBody>
+      </p:sp>
+      <p:sp>
+        <p:nvSpPr>
+          <p:cNvPr id="15" name="sketch line">
+            <a:extLst>
+              <a:ext uri="{FF2B5EF4-FFF2-40B4-BE49-F238E27FC236}">
+                <a16:creationId xmlns:a16="http://schemas.microsoft.com/office/drawing/2014/main" id="{4B030A0D-0DAD-4A99-89BB-419527D6A64B}"/>
+              </a:ext>
+              <a:ext uri="{C183D7F6-B498-43B3-948B-1728B52AA6E4}">
+                <adec:decorative xmlns:adec="http://schemas.microsoft.com/office/drawing/2017/decorative" val="1"/>
+              </a:ext>
+            </a:extLst>
+          </p:cNvPr>
+          <p:cNvSpPr>
+            <a:spLocks noGrp="1" noRot="1" noChangeAspect="1" noMove="1" noResize="1" noEditPoints="1" noAdjustHandles="1" noChangeArrowheads="1" noChangeShapeType="1" noTextEdit="1"/>
+          </p:cNvSpPr>
+          <p:nvPr>
+            <p:extLst>
+              <p:ext uri="{386F3935-93C4-4BCD-93E2-E3B085C9AB24}">
+                <p16:designElem xmlns:p16="http://schemas.microsoft.com/office/powerpoint/2015/main" val="1"/>
+              </p:ext>
+            </p:extLst>
+          </p:nvPr>
+        </p:nvSpPr>
+        <p:spPr>
+          <a:xfrm>
+            <a:off x="3389376" y="1800088"/>
+            <a:ext cx="5410200" cy="18288"/>
+          </a:xfrm>
+          <a:custGeom>
+            <a:avLst/>
+            <a:gdLst>
+              <a:gd name="connsiteX0" fmla="*/ 0 w 5410200"/>
+              <a:gd name="connsiteY0" fmla="*/ 0 h 18288"/>
+              <a:gd name="connsiteX1" fmla="*/ 568071 w 5410200"/>
+              <a:gd name="connsiteY1" fmla="*/ 0 h 18288"/>
+              <a:gd name="connsiteX2" fmla="*/ 1298448 w 5410200"/>
+              <a:gd name="connsiteY2" fmla="*/ 0 h 18288"/>
+              <a:gd name="connsiteX3" fmla="*/ 1920621 w 5410200"/>
+              <a:gd name="connsiteY3" fmla="*/ 0 h 18288"/>
+              <a:gd name="connsiteX4" fmla="*/ 2488692 w 5410200"/>
+              <a:gd name="connsiteY4" fmla="*/ 0 h 18288"/>
+              <a:gd name="connsiteX5" fmla="*/ 3219069 w 5410200"/>
+              <a:gd name="connsiteY5" fmla="*/ 0 h 18288"/>
+              <a:gd name="connsiteX6" fmla="*/ 3895344 w 5410200"/>
+              <a:gd name="connsiteY6" fmla="*/ 0 h 18288"/>
+              <a:gd name="connsiteX7" fmla="*/ 4571619 w 5410200"/>
+              <a:gd name="connsiteY7" fmla="*/ 0 h 18288"/>
+              <a:gd name="connsiteX8" fmla="*/ 5410200 w 5410200"/>
+              <a:gd name="connsiteY8" fmla="*/ 0 h 18288"/>
+              <a:gd name="connsiteX9" fmla="*/ 5410200 w 5410200"/>
+              <a:gd name="connsiteY9" fmla="*/ 18288 h 18288"/>
+              <a:gd name="connsiteX10" fmla="*/ 4842129 w 5410200"/>
+              <a:gd name="connsiteY10" fmla="*/ 18288 h 18288"/>
+              <a:gd name="connsiteX11" fmla="*/ 4328160 w 5410200"/>
+              <a:gd name="connsiteY11" fmla="*/ 18288 h 18288"/>
+              <a:gd name="connsiteX12" fmla="*/ 3597783 w 5410200"/>
+              <a:gd name="connsiteY12" fmla="*/ 18288 h 18288"/>
+              <a:gd name="connsiteX13" fmla="*/ 3029712 w 5410200"/>
+              <a:gd name="connsiteY13" fmla="*/ 18288 h 18288"/>
+              <a:gd name="connsiteX14" fmla="*/ 2299335 w 5410200"/>
+              <a:gd name="connsiteY14" fmla="*/ 18288 h 18288"/>
+              <a:gd name="connsiteX15" fmla="*/ 1514856 w 5410200"/>
+              <a:gd name="connsiteY15" fmla="*/ 18288 h 18288"/>
+              <a:gd name="connsiteX16" fmla="*/ 892683 w 5410200"/>
+              <a:gd name="connsiteY16" fmla="*/ 18288 h 18288"/>
+              <a:gd name="connsiteX17" fmla="*/ 0 w 5410200"/>
+              <a:gd name="connsiteY17" fmla="*/ 18288 h 18288"/>
+              <a:gd name="connsiteX18" fmla="*/ 0 w 5410200"/>
+              <a:gd name="connsiteY18" fmla="*/ 0 h 18288"/>
+            </a:gdLst>
+            <a:ahLst/>
+            <a:cxnLst>
+              <a:cxn ang="0">
+                <a:pos x="connsiteX0" y="connsiteY0"/>
+              </a:cxn>
+              <a:cxn ang="0">
+                <a:pos x="connsiteX1" y="connsiteY1"/>
+              </a:cxn>
+              <a:cxn ang="0">
+                <a:pos x="connsiteX2" y="connsiteY2"/>
+              </a:cxn>
+              <a:cxn ang="0">
+                <a:pos x="connsiteX3" y="connsiteY3"/>
+              </a:cxn>
+              <a:cxn ang="0">
+                <a:pos x="connsiteX4" y="connsiteY4"/>
+              </a:cxn>
+              <a:cxn ang="0">
+                <a:pos x="connsiteX5" y="connsiteY5"/>
+              </a:cxn>
+              <a:cxn ang="0">
+                <a:pos x="connsiteX6" y="connsiteY6"/>
+              </a:cxn>
+              <a:cxn ang="0">
+                <a:pos x="connsiteX7" y="connsiteY7"/>
+              </a:cxn>
+              <a:cxn ang="0">
+                <a:pos x="connsiteX8" y="connsiteY8"/>
+              </a:cxn>
+              <a:cxn ang="0">
+                <a:pos x="connsiteX9" y="connsiteY9"/>
+              </a:cxn>
+              <a:cxn ang="0">
+                <a:pos x="connsiteX10" y="connsiteY10"/>
+              </a:cxn>
+              <a:cxn ang="0">
+                <a:pos x="connsiteX11" y="connsiteY11"/>
+              </a:cxn>
+              <a:cxn ang="0">
+                <a:pos x="connsiteX12" y="connsiteY12"/>
+              </a:cxn>
+              <a:cxn ang="0">
+                <a:pos x="connsiteX13" y="connsiteY13"/>
+              </a:cxn>
+              <a:cxn ang="0">
+                <a:pos x="connsiteX14" y="connsiteY14"/>
+              </a:cxn>
+              <a:cxn ang="0">
+                <a:pos x="connsiteX15" y="connsiteY15"/>
+              </a:cxn>
+              <a:cxn ang="0">
+                <a:pos x="connsiteX16" y="connsiteY16"/>
+              </a:cxn>
+              <a:cxn ang="0">
+                <a:pos x="connsiteX17" y="connsiteY17"/>
+              </a:cxn>
+              <a:cxn ang="0">
+                <a:pos x="connsiteX18" y="connsiteY18"/>
+              </a:cxn>
+            </a:cxnLst>
+            <a:rect l="l" t="t" r="r" b="b"/>
+            <a:pathLst>
+              <a:path w="5410200" h="18288" fill="none" extrusionOk="0">
+                <a:moveTo>
+                  <a:pt x="0" y="0"/>
+                </a:moveTo>
+                <a:cubicBezTo>
+                  <a:pt x="163050" y="-18707"/>
+                  <a:pt x="319321" y="-16364"/>
+                  <a:pt x="568071" y="0"/>
+                </a:cubicBezTo>
+                <a:cubicBezTo>
+                  <a:pt x="816821" y="16364"/>
+                  <a:pt x="1013224" y="-7268"/>
+                  <a:pt x="1298448" y="0"/>
+                </a:cubicBezTo>
+                <a:cubicBezTo>
+                  <a:pt x="1583672" y="7268"/>
+                  <a:pt x="1631711" y="-3367"/>
+                  <a:pt x="1920621" y="0"/>
+                </a:cubicBezTo>
+                <a:cubicBezTo>
+                  <a:pt x="2209531" y="3367"/>
+                  <a:pt x="2364420" y="-19184"/>
+                  <a:pt x="2488692" y="0"/>
+                </a:cubicBezTo>
+                <a:cubicBezTo>
+                  <a:pt x="2612964" y="19184"/>
+                  <a:pt x="3023298" y="-34627"/>
+                  <a:pt x="3219069" y="0"/>
+                </a:cubicBezTo>
+                <a:cubicBezTo>
+                  <a:pt x="3414840" y="34627"/>
+                  <a:pt x="3656810" y="24043"/>
+                  <a:pt x="3895344" y="0"/>
+                </a:cubicBezTo>
+                <a:cubicBezTo>
+                  <a:pt x="4133879" y="-24043"/>
+                  <a:pt x="4393984" y="-19577"/>
+                  <a:pt x="4571619" y="0"/>
+                </a:cubicBezTo>
+                <a:cubicBezTo>
+                  <a:pt x="4749255" y="19577"/>
+                  <a:pt x="5179928" y="-6281"/>
+                  <a:pt x="5410200" y="0"/>
+                </a:cubicBezTo>
+                <a:cubicBezTo>
+                  <a:pt x="5410730" y="6954"/>
+                  <a:pt x="5410934" y="12839"/>
+                  <a:pt x="5410200" y="18288"/>
+                </a:cubicBezTo>
+                <a:cubicBezTo>
+                  <a:pt x="5139060" y="6751"/>
+                  <a:pt x="5121593" y="31035"/>
+                  <a:pt x="4842129" y="18288"/>
+                </a:cubicBezTo>
+                <a:cubicBezTo>
+                  <a:pt x="4562665" y="5541"/>
+                  <a:pt x="4448273" y="9487"/>
+                  <a:pt x="4328160" y="18288"/>
+                </a:cubicBezTo>
+                <a:cubicBezTo>
+                  <a:pt x="4208047" y="27089"/>
+                  <a:pt x="3760936" y="22567"/>
+                  <a:pt x="3597783" y="18288"/>
+                </a:cubicBezTo>
+                <a:cubicBezTo>
+                  <a:pt x="3434630" y="14009"/>
+                  <a:pt x="3299718" y="33213"/>
+                  <a:pt x="3029712" y="18288"/>
+                </a:cubicBezTo>
+                <a:cubicBezTo>
+                  <a:pt x="2759706" y="3363"/>
+                  <a:pt x="2640159" y="27394"/>
+                  <a:pt x="2299335" y="18288"/>
+                </a:cubicBezTo>
+                <a:cubicBezTo>
+                  <a:pt x="1958511" y="9182"/>
+                  <a:pt x="1801186" y="28985"/>
+                  <a:pt x="1514856" y="18288"/>
+                </a:cubicBezTo>
+                <a:cubicBezTo>
+                  <a:pt x="1228526" y="7591"/>
+                  <a:pt x="1063509" y="-5305"/>
+                  <a:pt x="892683" y="18288"/>
+                </a:cubicBezTo>
+                <a:cubicBezTo>
+                  <a:pt x="721857" y="41881"/>
+                  <a:pt x="186945" y="-20897"/>
+                  <a:pt x="0" y="18288"/>
+                </a:cubicBezTo>
+                <a:cubicBezTo>
+                  <a:pt x="-570" y="9279"/>
+                  <a:pt x="132" y="5100"/>
+                  <a:pt x="0" y="0"/>
+                </a:cubicBezTo>
+                <a:close/>
+              </a:path>
+              <a:path w="5410200" h="18288" stroke="0" extrusionOk="0">
+                <a:moveTo>
+                  <a:pt x="0" y="0"/>
+                </a:moveTo>
+                <a:cubicBezTo>
+                  <a:pt x="285096" y="-4925"/>
+                  <a:pt x="376456" y="22268"/>
+                  <a:pt x="622173" y="0"/>
+                </a:cubicBezTo>
+                <a:cubicBezTo>
+                  <a:pt x="867890" y="-22268"/>
+                  <a:pt x="1031392" y="7228"/>
+                  <a:pt x="1136142" y="0"/>
+                </a:cubicBezTo>
+                <a:cubicBezTo>
+                  <a:pt x="1240892" y="-7228"/>
+                  <a:pt x="1561853" y="9877"/>
+                  <a:pt x="1920621" y="0"/>
+                </a:cubicBezTo>
+                <a:cubicBezTo>
+                  <a:pt x="2279389" y="-9877"/>
+                  <a:pt x="2367255" y="19546"/>
+                  <a:pt x="2542794" y="0"/>
+                </a:cubicBezTo>
+                <a:cubicBezTo>
+                  <a:pt x="2718333" y="-19546"/>
+                  <a:pt x="2866732" y="-22226"/>
+                  <a:pt x="3164967" y="0"/>
+                </a:cubicBezTo>
+                <a:cubicBezTo>
+                  <a:pt x="3463202" y="22226"/>
+                  <a:pt x="3568055" y="-2765"/>
+                  <a:pt x="3949446" y="0"/>
+                </a:cubicBezTo>
+                <a:cubicBezTo>
+                  <a:pt x="4330837" y="2765"/>
+                  <a:pt x="4287895" y="10557"/>
+                  <a:pt x="4517517" y="0"/>
+                </a:cubicBezTo>
+                <a:cubicBezTo>
+                  <a:pt x="4747139" y="-10557"/>
+                  <a:pt x="5149588" y="8716"/>
+                  <a:pt x="5410200" y="0"/>
+                </a:cubicBezTo>
+                <a:cubicBezTo>
+                  <a:pt x="5409517" y="5414"/>
+                  <a:pt x="5409480" y="12510"/>
+                  <a:pt x="5410200" y="18288"/>
+                </a:cubicBezTo>
+                <a:cubicBezTo>
+                  <a:pt x="5163327" y="41494"/>
+                  <a:pt x="5008749" y="10693"/>
+                  <a:pt x="4842129" y="18288"/>
+                </a:cubicBezTo>
+                <a:cubicBezTo>
+                  <a:pt x="4675509" y="25883"/>
+                  <a:pt x="4433401" y="-615"/>
+                  <a:pt x="4165854" y="18288"/>
+                </a:cubicBezTo>
+                <a:cubicBezTo>
+                  <a:pt x="3898308" y="37191"/>
+                  <a:pt x="3809032" y="-8710"/>
+                  <a:pt x="3543681" y="18288"/>
+                </a:cubicBezTo>
+                <a:cubicBezTo>
+                  <a:pt x="3278330" y="45286"/>
+                  <a:pt x="3073876" y="-15917"/>
+                  <a:pt x="2759202" y="18288"/>
+                </a:cubicBezTo>
+                <a:cubicBezTo>
+                  <a:pt x="2444528" y="52493"/>
+                  <a:pt x="2204144" y="3372"/>
+                  <a:pt x="1974723" y="18288"/>
+                </a:cubicBezTo>
+                <a:cubicBezTo>
+                  <a:pt x="1745302" y="33204"/>
+                  <a:pt x="1602335" y="31490"/>
+                  <a:pt x="1406652" y="18288"/>
+                </a:cubicBezTo>
+                <a:cubicBezTo>
+                  <a:pt x="1210969" y="5086"/>
+                  <a:pt x="923948" y="3161"/>
+                  <a:pt x="730377" y="18288"/>
+                </a:cubicBezTo>
+                <a:cubicBezTo>
+                  <a:pt x="536806" y="33415"/>
+                  <a:pt x="336496" y="-141"/>
+                  <a:pt x="0" y="18288"/>
+                </a:cubicBezTo>
+                <a:cubicBezTo>
+                  <a:pt x="-306" y="11061"/>
+                  <a:pt x="-655" y="7751"/>
+                  <a:pt x="0" y="0"/>
+                </a:cubicBezTo>
+                <a:close/>
+              </a:path>
+            </a:pathLst>
+          </a:custGeom>
+          <a:solidFill>
+            <a:schemeClr val="accent2"/>
+          </a:solidFill>
+          <a:ln w="41275" cap="rnd">
+            <a:solidFill>
+              <a:schemeClr val="accent2"/>
+            </a:solidFill>
+            <a:round/>
+            <a:extLst>
+              <a:ext uri="{C807C97D-BFC1-408E-A445-0C87EB9F89A2}">
+                <ask:lineSketchStyleProps xmlns:ask="http://schemas.microsoft.com/office/drawing/2018/sketchyshapes" sd="1219033472">
+                  <a:prstGeom prst="rect">
+                    <a:avLst/>
+                  </a:prstGeom>
+                  <ask:type>
+                    <ask:lineSketchFreehand/>
+                  </ask:type>
+                </ask:lineSketchStyleProps>
+              </a:ext>
+            </a:extLst>
+          </a:ln>
+        </p:spPr>
+        <p:style>
+          <a:lnRef idx="2">
+            <a:schemeClr val="accent1">
+              <a:shade val="50000"/>
+            </a:schemeClr>
+          </a:lnRef>
+          <a:fillRef idx="1">
+            <a:schemeClr val="accent1"/>
+          </a:fillRef>
+          <a:effectRef idx="0">
+            <a:schemeClr val="accent1"/>
+          </a:effectRef>
+          <a:fontRef idx="minor">
+            <a:schemeClr val="lt1"/>
+          </a:fontRef>
+        </p:style>
+        <p:txBody>
+          <a:bodyPr rtlCol="0" anchor="ctr"/>
+          <a:lstStyle/>
+          <a:p>
+            <a:pPr algn="ctr"/>
+            <a:endParaRPr lang="en-US"/>
+          </a:p>
+        </p:txBody>
+      </p:sp>
+      <p:pic>
+        <p:nvPicPr>
+          <p:cNvPr id="4" name="Picture 3" descr="A picture containing text, screenshot, colorfulness, rectangle&#10;&#10;Description automatically generated">
+            <a:extLst>
+              <a:ext uri="{FF2B5EF4-FFF2-40B4-BE49-F238E27FC236}">
+                <a16:creationId xmlns:a16="http://schemas.microsoft.com/office/drawing/2014/main" id="{388FF566-BEDE-32C5-E630-40D7613BD6D6}"/>
+              </a:ext>
+            </a:extLst>
+          </p:cNvPr>
+          <p:cNvPicPr>
+            <a:picLocks noChangeAspect="1"/>
+          </p:cNvPicPr>
+          <p:nvPr/>
+        </p:nvPicPr>
+        <p:blipFill>
+          <a:blip r:embed="rId2">
+            <a:extLst>
+              <a:ext uri="{28A0092B-C50C-407E-A947-70E740481C1C}">
+                <a14:useLocalDpi xmlns:a14="http://schemas.microsoft.com/office/drawing/2010/main" val="0"/>
+              </a:ext>
+            </a:extLst>
+          </a:blip>
+          <a:stretch>
+            <a:fillRect/>
+          </a:stretch>
+        </p:blipFill>
+        <p:spPr>
+          <a:xfrm>
+            <a:off x="292608" y="3405095"/>
+            <a:ext cx="3758184" cy="2029419"/>
+          </a:xfrm>
+          <a:prstGeom prst="rect">
+            <a:avLst/>
+          </a:prstGeom>
+        </p:spPr>
+      </p:pic>
+      <p:pic>
+        <p:nvPicPr>
+          <p:cNvPr id="6" name="Picture 5" descr="A picture containing text, screenshot, colorfulness, rectangle&#10;&#10;Description automatically generated">
+            <a:extLst>
+              <a:ext uri="{FF2B5EF4-FFF2-40B4-BE49-F238E27FC236}">
+                <a16:creationId xmlns:a16="http://schemas.microsoft.com/office/drawing/2014/main" id="{7F2DA5B2-DBF4-E451-8A52-1DA6766E43D0}"/>
+              </a:ext>
+            </a:extLst>
+          </p:cNvPr>
+          <p:cNvPicPr>
+            <a:picLocks noChangeAspect="1"/>
+          </p:cNvPicPr>
+          <p:nvPr/>
+        </p:nvPicPr>
+        <p:blipFill>
+          <a:blip r:embed="rId3">
+            <a:extLst>
+              <a:ext uri="{28A0092B-C50C-407E-A947-70E740481C1C}">
+                <a14:useLocalDpi xmlns:a14="http://schemas.microsoft.com/office/drawing/2010/main" val="0"/>
+              </a:ext>
+            </a:extLst>
+          </a:blip>
+          <a:stretch>
+            <a:fillRect/>
+          </a:stretch>
+        </p:blipFill>
+        <p:spPr>
+          <a:xfrm>
+            <a:off x="4216908" y="3405095"/>
+            <a:ext cx="3758184" cy="2029419"/>
+          </a:xfrm>
+          <a:prstGeom prst="rect">
+            <a:avLst/>
+          </a:prstGeom>
+        </p:spPr>
+      </p:pic>
+      <p:pic>
+        <p:nvPicPr>
+          <p:cNvPr id="8" name="Picture 7" descr="A picture containing screenshot, text, colorfulness, rectangle&#10;&#10;Description automatically generated">
+            <a:extLst>
+              <a:ext uri="{FF2B5EF4-FFF2-40B4-BE49-F238E27FC236}">
+                <a16:creationId xmlns:a16="http://schemas.microsoft.com/office/drawing/2014/main" id="{191D826F-5F50-81B7-D40A-6D60EE4A8CC9}"/>
+              </a:ext>
+            </a:extLst>
+          </p:cNvPr>
+          <p:cNvPicPr>
+            <a:picLocks noChangeAspect="1"/>
+          </p:cNvPicPr>
+          <p:nvPr/>
+        </p:nvPicPr>
+        <p:blipFill>
+          <a:blip r:embed="rId4">
+            <a:extLst>
+              <a:ext uri="{28A0092B-C50C-407E-A947-70E740481C1C}">
+                <a14:useLocalDpi xmlns:a14="http://schemas.microsoft.com/office/drawing/2010/main" val="0"/>
+              </a:ext>
+            </a:extLst>
+          </a:blip>
+          <a:stretch>
+            <a:fillRect/>
+          </a:stretch>
+        </p:blipFill>
+        <p:spPr>
+          <a:xfrm>
+            <a:off x="8141208" y="3405095"/>
+            <a:ext cx="3758184" cy="2029419"/>
+          </a:xfrm>
+          <a:prstGeom prst="rect">
+            <a:avLst/>
+          </a:prstGeom>
+        </p:spPr>
+      </p:pic>
+    </p:spTree>
+    <p:extLst>
+      <p:ext uri="{BB962C8B-B14F-4D97-AF65-F5344CB8AC3E}">
+        <p14:creationId xmlns:p14="http://schemas.microsoft.com/office/powerpoint/2010/main" val="2852195015"/>
       </p:ext>
     </p:extLst>
   </p:cSld>
@@ -8189,6 +9979,18 @@
               </a:rPr>
               <a:t>Support Vector Machine: SVC </a:t>
             </a:r>
+          </a:p>
+          <a:p>
+            <a:pPr marL="285750" indent="-285750" algn="l">
+              <a:buFont typeface="Arial" panose="020B0604020202020204" pitchFamily="34" charset="0"/>
+              <a:buChar char="•"/>
+            </a:pPr>
+            <a:r>
+              <a:rPr lang="en-US" sz="1800" dirty="0">
+                <a:latin typeface="Lexend"/>
+              </a:rPr>
+              <a:t>Stochastic Gradient Descent : SGD</a:t>
+            </a:r>
             <a:br>
               <a:rPr lang="en-GB" dirty="0">
                 <a:latin typeface="Lexend"/>
@@ -8276,6 +10078,14 @@
 <file path=ppt/slides/slide8.xml><?xml version="1.0" encoding="utf-8"?>
 <p:sld xmlns:a="http://schemas.openxmlformats.org/drawingml/2006/main" xmlns:r="http://schemas.openxmlformats.org/officeDocument/2006/relationships" xmlns:p="http://schemas.openxmlformats.org/presentationml/2006/main">
   <p:cSld>
+    <p:bg>
+      <p:bgPr>
+        <a:solidFill>
+          <a:schemeClr val="bg1"/>
+        </a:solidFill>
+        <a:effectLst/>
+      </p:bgPr>
+    </p:bg>
     <p:spTree>
       <p:nvGrpSpPr>
         <p:cNvPr id="1" name=""/>
@@ -8290,6 +10100,66 @@
           <a:chExt cx="0" cy="0"/>
         </a:xfrm>
       </p:grpSpPr>
+      <p:sp useBgFill="1">
+        <p:nvSpPr>
+          <p:cNvPr id="25" name="Rectangle 24">
+            <a:extLst>
+              <a:ext uri="{FF2B5EF4-FFF2-40B4-BE49-F238E27FC236}">
+                <a16:creationId xmlns:a16="http://schemas.microsoft.com/office/drawing/2014/main" id="{7C98A213-5994-475E-B327-DC6EC27FBA8B}"/>
+              </a:ext>
+              <a:ext uri="{C183D7F6-B498-43B3-948B-1728B52AA6E4}">
+                <adec:decorative xmlns:adec="http://schemas.microsoft.com/office/drawing/2017/decorative" val="1"/>
+              </a:ext>
+            </a:extLst>
+          </p:cNvPr>
+          <p:cNvSpPr>
+            <a:spLocks noGrp="1" noRot="1" noChangeAspect="1" noMove="1" noResize="1" noEditPoints="1" noAdjustHandles="1" noChangeArrowheads="1" noChangeShapeType="1" noTextEdit="1"/>
+          </p:cNvSpPr>
+          <p:nvPr>
+            <p:extLst>
+              <p:ext uri="{386F3935-93C4-4BCD-93E2-E3B085C9AB24}">
+                <p16:designElem xmlns:p16="http://schemas.microsoft.com/office/powerpoint/2015/main" val="1"/>
+              </p:ext>
+            </p:extLst>
+          </p:nvPr>
+        </p:nvSpPr>
+        <p:spPr>
+          <a:xfrm>
+            <a:off x="0" y="0"/>
+            <a:ext cx="12188952" cy="6858000"/>
+          </a:xfrm>
+          <a:prstGeom prst="rect">
+            <a:avLst/>
+          </a:prstGeom>
+          <a:ln>
+            <a:noFill/>
+          </a:ln>
+        </p:spPr>
+        <p:style>
+          <a:lnRef idx="2">
+            <a:schemeClr val="accent1">
+              <a:shade val="50000"/>
+            </a:schemeClr>
+          </a:lnRef>
+          <a:fillRef idx="1">
+            <a:schemeClr val="accent1"/>
+          </a:fillRef>
+          <a:effectRef idx="0">
+            <a:schemeClr val="accent1"/>
+          </a:effectRef>
+          <a:fontRef idx="minor">
+            <a:schemeClr val="lt1"/>
+          </a:fontRef>
+        </p:style>
+        <p:txBody>
+          <a:bodyPr rtlCol="0" anchor="ctr"/>
+          <a:lstStyle/>
+          <a:p>
+            <a:pPr algn="ctr"/>
+            <a:endParaRPr lang="en-US"/>
+          </a:p>
+        </p:txBody>
+      </p:sp>
       <p:sp>
         <p:nvSpPr>
           <p:cNvPr id="2" name="Title 1">
@@ -8306,23 +10176,509 @@
             <p:ph type="title"/>
           </p:nvPr>
         </p:nvSpPr>
-        <p:spPr/>
+        <p:spPr>
+          <a:xfrm>
+            <a:off x="638881" y="670218"/>
+            <a:ext cx="10909640" cy="1065836"/>
+          </a:xfrm>
+        </p:spPr>
         <p:txBody>
-          <a:bodyPr/>
+          <a:bodyPr vert="horz" lIns="91440" tIns="45720" rIns="91440" bIns="45720" rtlCol="0" anchor="ctr">
+            <a:normAutofit/>
+          </a:bodyPr>
           <a:lstStyle/>
           <a:p>
-            <a:r>
-              <a:rPr lang="en-US" dirty="0" err="1"/>
-              <a:t>Graficos</a:t>
-            </a:r>
-            <a:r>
-              <a:rPr lang="en-US" dirty="0"/>
-              <a:t> da accuracy</a:t>
-            </a:r>
-            <a:endParaRPr lang="en-GB" dirty="0"/>
+            <a:pPr algn="ctr"/>
+            <a:r>
+              <a:rPr lang="en-US" sz="6600" dirty="0">
+                <a:latin typeface="Lexend"/>
+              </a:rPr>
+              <a:t>Neural Network</a:t>
+            </a:r>
           </a:p>
         </p:txBody>
       </p:sp>
+      <p:sp>
+        <p:nvSpPr>
+          <p:cNvPr id="27" name="sketch line">
+            <a:extLst>
+              <a:ext uri="{FF2B5EF4-FFF2-40B4-BE49-F238E27FC236}">
+                <a16:creationId xmlns:a16="http://schemas.microsoft.com/office/drawing/2014/main" id="{4B030A0D-0DAD-4A99-89BB-419527D6A64B}"/>
+              </a:ext>
+              <a:ext uri="{C183D7F6-B498-43B3-948B-1728B52AA6E4}">
+                <adec:decorative xmlns:adec="http://schemas.microsoft.com/office/drawing/2017/decorative" val="1"/>
+              </a:ext>
+            </a:extLst>
+          </p:cNvPr>
+          <p:cNvSpPr>
+            <a:spLocks noGrp="1" noRot="1" noChangeAspect="1" noMove="1" noResize="1" noEditPoints="1" noAdjustHandles="1" noChangeArrowheads="1" noChangeShapeType="1" noTextEdit="1"/>
+          </p:cNvSpPr>
+          <p:nvPr>
+            <p:extLst>
+              <p:ext uri="{386F3935-93C4-4BCD-93E2-E3B085C9AB24}">
+                <p16:designElem xmlns:p16="http://schemas.microsoft.com/office/powerpoint/2015/main" val="1"/>
+              </p:ext>
+            </p:extLst>
+          </p:nvPr>
+        </p:nvSpPr>
+        <p:spPr>
+          <a:xfrm>
+            <a:off x="3389376" y="1800088"/>
+            <a:ext cx="5410200" cy="18288"/>
+          </a:xfrm>
+          <a:custGeom>
+            <a:avLst/>
+            <a:gdLst>
+              <a:gd name="connsiteX0" fmla="*/ 0 w 5410200"/>
+              <a:gd name="connsiteY0" fmla="*/ 0 h 18288"/>
+              <a:gd name="connsiteX1" fmla="*/ 568071 w 5410200"/>
+              <a:gd name="connsiteY1" fmla="*/ 0 h 18288"/>
+              <a:gd name="connsiteX2" fmla="*/ 1298448 w 5410200"/>
+              <a:gd name="connsiteY2" fmla="*/ 0 h 18288"/>
+              <a:gd name="connsiteX3" fmla="*/ 1920621 w 5410200"/>
+              <a:gd name="connsiteY3" fmla="*/ 0 h 18288"/>
+              <a:gd name="connsiteX4" fmla="*/ 2488692 w 5410200"/>
+              <a:gd name="connsiteY4" fmla="*/ 0 h 18288"/>
+              <a:gd name="connsiteX5" fmla="*/ 3219069 w 5410200"/>
+              <a:gd name="connsiteY5" fmla="*/ 0 h 18288"/>
+              <a:gd name="connsiteX6" fmla="*/ 3895344 w 5410200"/>
+              <a:gd name="connsiteY6" fmla="*/ 0 h 18288"/>
+              <a:gd name="connsiteX7" fmla="*/ 4571619 w 5410200"/>
+              <a:gd name="connsiteY7" fmla="*/ 0 h 18288"/>
+              <a:gd name="connsiteX8" fmla="*/ 5410200 w 5410200"/>
+              <a:gd name="connsiteY8" fmla="*/ 0 h 18288"/>
+              <a:gd name="connsiteX9" fmla="*/ 5410200 w 5410200"/>
+              <a:gd name="connsiteY9" fmla="*/ 18288 h 18288"/>
+              <a:gd name="connsiteX10" fmla="*/ 4842129 w 5410200"/>
+              <a:gd name="connsiteY10" fmla="*/ 18288 h 18288"/>
+              <a:gd name="connsiteX11" fmla="*/ 4328160 w 5410200"/>
+              <a:gd name="connsiteY11" fmla="*/ 18288 h 18288"/>
+              <a:gd name="connsiteX12" fmla="*/ 3597783 w 5410200"/>
+              <a:gd name="connsiteY12" fmla="*/ 18288 h 18288"/>
+              <a:gd name="connsiteX13" fmla="*/ 3029712 w 5410200"/>
+              <a:gd name="connsiteY13" fmla="*/ 18288 h 18288"/>
+              <a:gd name="connsiteX14" fmla="*/ 2299335 w 5410200"/>
+              <a:gd name="connsiteY14" fmla="*/ 18288 h 18288"/>
+              <a:gd name="connsiteX15" fmla="*/ 1514856 w 5410200"/>
+              <a:gd name="connsiteY15" fmla="*/ 18288 h 18288"/>
+              <a:gd name="connsiteX16" fmla="*/ 892683 w 5410200"/>
+              <a:gd name="connsiteY16" fmla="*/ 18288 h 18288"/>
+              <a:gd name="connsiteX17" fmla="*/ 0 w 5410200"/>
+              <a:gd name="connsiteY17" fmla="*/ 18288 h 18288"/>
+              <a:gd name="connsiteX18" fmla="*/ 0 w 5410200"/>
+              <a:gd name="connsiteY18" fmla="*/ 0 h 18288"/>
+            </a:gdLst>
+            <a:ahLst/>
+            <a:cxnLst>
+              <a:cxn ang="0">
+                <a:pos x="connsiteX0" y="connsiteY0"/>
+              </a:cxn>
+              <a:cxn ang="0">
+                <a:pos x="connsiteX1" y="connsiteY1"/>
+              </a:cxn>
+              <a:cxn ang="0">
+                <a:pos x="connsiteX2" y="connsiteY2"/>
+              </a:cxn>
+              <a:cxn ang="0">
+                <a:pos x="connsiteX3" y="connsiteY3"/>
+              </a:cxn>
+              <a:cxn ang="0">
+                <a:pos x="connsiteX4" y="connsiteY4"/>
+              </a:cxn>
+              <a:cxn ang="0">
+                <a:pos x="connsiteX5" y="connsiteY5"/>
+              </a:cxn>
+              <a:cxn ang="0">
+                <a:pos x="connsiteX6" y="connsiteY6"/>
+              </a:cxn>
+              <a:cxn ang="0">
+                <a:pos x="connsiteX7" y="connsiteY7"/>
+              </a:cxn>
+              <a:cxn ang="0">
+                <a:pos x="connsiteX8" y="connsiteY8"/>
+              </a:cxn>
+              <a:cxn ang="0">
+                <a:pos x="connsiteX9" y="connsiteY9"/>
+              </a:cxn>
+              <a:cxn ang="0">
+                <a:pos x="connsiteX10" y="connsiteY10"/>
+              </a:cxn>
+              <a:cxn ang="0">
+                <a:pos x="connsiteX11" y="connsiteY11"/>
+              </a:cxn>
+              <a:cxn ang="0">
+                <a:pos x="connsiteX12" y="connsiteY12"/>
+              </a:cxn>
+              <a:cxn ang="0">
+                <a:pos x="connsiteX13" y="connsiteY13"/>
+              </a:cxn>
+              <a:cxn ang="0">
+                <a:pos x="connsiteX14" y="connsiteY14"/>
+              </a:cxn>
+              <a:cxn ang="0">
+                <a:pos x="connsiteX15" y="connsiteY15"/>
+              </a:cxn>
+              <a:cxn ang="0">
+                <a:pos x="connsiteX16" y="connsiteY16"/>
+              </a:cxn>
+              <a:cxn ang="0">
+                <a:pos x="connsiteX17" y="connsiteY17"/>
+              </a:cxn>
+              <a:cxn ang="0">
+                <a:pos x="connsiteX18" y="connsiteY18"/>
+              </a:cxn>
+            </a:cxnLst>
+            <a:rect l="l" t="t" r="r" b="b"/>
+            <a:pathLst>
+              <a:path w="5410200" h="18288" fill="none" extrusionOk="0">
+                <a:moveTo>
+                  <a:pt x="0" y="0"/>
+                </a:moveTo>
+                <a:cubicBezTo>
+                  <a:pt x="163050" y="-18707"/>
+                  <a:pt x="319321" y="-16364"/>
+                  <a:pt x="568071" y="0"/>
+                </a:cubicBezTo>
+                <a:cubicBezTo>
+                  <a:pt x="816821" y="16364"/>
+                  <a:pt x="1013224" y="-7268"/>
+                  <a:pt x="1298448" y="0"/>
+                </a:cubicBezTo>
+                <a:cubicBezTo>
+                  <a:pt x="1583672" y="7268"/>
+                  <a:pt x="1631711" y="-3367"/>
+                  <a:pt x="1920621" y="0"/>
+                </a:cubicBezTo>
+                <a:cubicBezTo>
+                  <a:pt x="2209531" y="3367"/>
+                  <a:pt x="2364420" y="-19184"/>
+                  <a:pt x="2488692" y="0"/>
+                </a:cubicBezTo>
+                <a:cubicBezTo>
+                  <a:pt x="2612964" y="19184"/>
+                  <a:pt x="3023298" y="-34627"/>
+                  <a:pt x="3219069" y="0"/>
+                </a:cubicBezTo>
+                <a:cubicBezTo>
+                  <a:pt x="3414840" y="34627"/>
+                  <a:pt x="3656810" y="24043"/>
+                  <a:pt x="3895344" y="0"/>
+                </a:cubicBezTo>
+                <a:cubicBezTo>
+                  <a:pt x="4133879" y="-24043"/>
+                  <a:pt x="4393984" y="-19577"/>
+                  <a:pt x="4571619" y="0"/>
+                </a:cubicBezTo>
+                <a:cubicBezTo>
+                  <a:pt x="4749255" y="19577"/>
+                  <a:pt x="5179928" y="-6281"/>
+                  <a:pt x="5410200" y="0"/>
+                </a:cubicBezTo>
+                <a:cubicBezTo>
+                  <a:pt x="5410730" y="6954"/>
+                  <a:pt x="5410934" y="12839"/>
+                  <a:pt x="5410200" y="18288"/>
+                </a:cubicBezTo>
+                <a:cubicBezTo>
+                  <a:pt x="5139060" y="6751"/>
+                  <a:pt x="5121593" y="31035"/>
+                  <a:pt x="4842129" y="18288"/>
+                </a:cubicBezTo>
+                <a:cubicBezTo>
+                  <a:pt x="4562665" y="5541"/>
+                  <a:pt x="4448273" y="9487"/>
+                  <a:pt x="4328160" y="18288"/>
+                </a:cubicBezTo>
+                <a:cubicBezTo>
+                  <a:pt x="4208047" y="27089"/>
+                  <a:pt x="3760936" y="22567"/>
+                  <a:pt x="3597783" y="18288"/>
+                </a:cubicBezTo>
+                <a:cubicBezTo>
+                  <a:pt x="3434630" y="14009"/>
+                  <a:pt x="3299718" y="33213"/>
+                  <a:pt x="3029712" y="18288"/>
+                </a:cubicBezTo>
+                <a:cubicBezTo>
+                  <a:pt x="2759706" y="3363"/>
+                  <a:pt x="2640159" y="27394"/>
+                  <a:pt x="2299335" y="18288"/>
+                </a:cubicBezTo>
+                <a:cubicBezTo>
+                  <a:pt x="1958511" y="9182"/>
+                  <a:pt x="1801186" y="28985"/>
+                  <a:pt x="1514856" y="18288"/>
+                </a:cubicBezTo>
+                <a:cubicBezTo>
+                  <a:pt x="1228526" y="7591"/>
+                  <a:pt x="1063509" y="-5305"/>
+                  <a:pt x="892683" y="18288"/>
+                </a:cubicBezTo>
+                <a:cubicBezTo>
+                  <a:pt x="721857" y="41881"/>
+                  <a:pt x="186945" y="-20897"/>
+                  <a:pt x="0" y="18288"/>
+                </a:cubicBezTo>
+                <a:cubicBezTo>
+                  <a:pt x="-570" y="9279"/>
+                  <a:pt x="132" y="5100"/>
+                  <a:pt x="0" y="0"/>
+                </a:cubicBezTo>
+                <a:close/>
+              </a:path>
+              <a:path w="5410200" h="18288" stroke="0" extrusionOk="0">
+                <a:moveTo>
+                  <a:pt x="0" y="0"/>
+                </a:moveTo>
+                <a:cubicBezTo>
+                  <a:pt x="285096" y="-4925"/>
+                  <a:pt x="376456" y="22268"/>
+                  <a:pt x="622173" y="0"/>
+                </a:cubicBezTo>
+                <a:cubicBezTo>
+                  <a:pt x="867890" y="-22268"/>
+                  <a:pt x="1031392" y="7228"/>
+                  <a:pt x="1136142" y="0"/>
+                </a:cubicBezTo>
+                <a:cubicBezTo>
+                  <a:pt x="1240892" y="-7228"/>
+                  <a:pt x="1561853" y="9877"/>
+                  <a:pt x="1920621" y="0"/>
+                </a:cubicBezTo>
+                <a:cubicBezTo>
+                  <a:pt x="2279389" y="-9877"/>
+                  <a:pt x="2367255" y="19546"/>
+                  <a:pt x="2542794" y="0"/>
+                </a:cubicBezTo>
+                <a:cubicBezTo>
+                  <a:pt x="2718333" y="-19546"/>
+                  <a:pt x="2866732" y="-22226"/>
+                  <a:pt x="3164967" y="0"/>
+                </a:cubicBezTo>
+                <a:cubicBezTo>
+                  <a:pt x="3463202" y="22226"/>
+                  <a:pt x="3568055" y="-2765"/>
+                  <a:pt x="3949446" y="0"/>
+                </a:cubicBezTo>
+                <a:cubicBezTo>
+                  <a:pt x="4330837" y="2765"/>
+                  <a:pt x="4287895" y="10557"/>
+                  <a:pt x="4517517" y="0"/>
+                </a:cubicBezTo>
+                <a:cubicBezTo>
+                  <a:pt x="4747139" y="-10557"/>
+                  <a:pt x="5149588" y="8716"/>
+                  <a:pt x="5410200" y="0"/>
+                </a:cubicBezTo>
+                <a:cubicBezTo>
+                  <a:pt x="5409517" y="5414"/>
+                  <a:pt x="5409480" y="12510"/>
+                  <a:pt x="5410200" y="18288"/>
+                </a:cubicBezTo>
+                <a:cubicBezTo>
+                  <a:pt x="5163327" y="41494"/>
+                  <a:pt x="5008749" y="10693"/>
+                  <a:pt x="4842129" y="18288"/>
+                </a:cubicBezTo>
+                <a:cubicBezTo>
+                  <a:pt x="4675509" y="25883"/>
+                  <a:pt x="4433401" y="-615"/>
+                  <a:pt x="4165854" y="18288"/>
+                </a:cubicBezTo>
+                <a:cubicBezTo>
+                  <a:pt x="3898308" y="37191"/>
+                  <a:pt x="3809032" y="-8710"/>
+                  <a:pt x="3543681" y="18288"/>
+                </a:cubicBezTo>
+                <a:cubicBezTo>
+                  <a:pt x="3278330" y="45286"/>
+                  <a:pt x="3073876" y="-15917"/>
+                  <a:pt x="2759202" y="18288"/>
+                </a:cubicBezTo>
+                <a:cubicBezTo>
+                  <a:pt x="2444528" y="52493"/>
+                  <a:pt x="2204144" y="3372"/>
+                  <a:pt x="1974723" y="18288"/>
+                </a:cubicBezTo>
+                <a:cubicBezTo>
+                  <a:pt x="1745302" y="33204"/>
+                  <a:pt x="1602335" y="31490"/>
+                  <a:pt x="1406652" y="18288"/>
+                </a:cubicBezTo>
+                <a:cubicBezTo>
+                  <a:pt x="1210969" y="5086"/>
+                  <a:pt x="923948" y="3161"/>
+                  <a:pt x="730377" y="18288"/>
+                </a:cubicBezTo>
+                <a:cubicBezTo>
+                  <a:pt x="536806" y="33415"/>
+                  <a:pt x="336496" y="-141"/>
+                  <a:pt x="0" y="18288"/>
+                </a:cubicBezTo>
+                <a:cubicBezTo>
+                  <a:pt x="-306" y="11061"/>
+                  <a:pt x="-655" y="7751"/>
+                  <a:pt x="0" y="0"/>
+                </a:cubicBezTo>
+                <a:close/>
+              </a:path>
+            </a:pathLst>
+          </a:custGeom>
+          <a:solidFill>
+            <a:schemeClr val="accent2"/>
+          </a:solidFill>
+          <a:ln w="41275" cap="rnd">
+            <a:solidFill>
+              <a:schemeClr val="accent2"/>
+            </a:solidFill>
+            <a:round/>
+            <a:extLst>
+              <a:ext uri="{C807C97D-BFC1-408E-A445-0C87EB9F89A2}">
+                <ask:lineSketchStyleProps xmlns:ask="http://schemas.microsoft.com/office/drawing/2018/sketchyshapes" sd="1219033472">
+                  <a:prstGeom prst="rect">
+                    <a:avLst/>
+                  </a:prstGeom>
+                  <ask:type>
+                    <ask:lineSketchFreehand/>
+                  </ask:type>
+                </ask:lineSketchStyleProps>
+              </a:ext>
+            </a:extLst>
+          </a:ln>
+        </p:spPr>
+        <p:style>
+          <a:lnRef idx="2">
+            <a:schemeClr val="accent1">
+              <a:shade val="50000"/>
+            </a:schemeClr>
+          </a:lnRef>
+          <a:fillRef idx="1">
+            <a:schemeClr val="accent1"/>
+          </a:fillRef>
+          <a:effectRef idx="0">
+            <a:schemeClr val="accent1"/>
+          </a:effectRef>
+          <a:fontRef idx="minor">
+            <a:schemeClr val="lt1"/>
+          </a:fontRef>
+        </p:style>
+        <p:txBody>
+          <a:bodyPr rtlCol="0" anchor="ctr"/>
+          <a:lstStyle/>
+          <a:p>
+            <a:pPr algn="ctr"/>
+            <a:endParaRPr lang="en-US"/>
+          </a:p>
+        </p:txBody>
+      </p:sp>
+      <p:pic>
+        <p:nvPicPr>
+          <p:cNvPr id="20" name="Picture 19" descr="A picture containing screenshot, text, colorfulness, rectangle&#10;&#10;Description automatically generated">
+            <a:extLst>
+              <a:ext uri="{FF2B5EF4-FFF2-40B4-BE49-F238E27FC236}">
+                <a16:creationId xmlns:a16="http://schemas.microsoft.com/office/drawing/2014/main" id="{0A779F6E-EA34-4743-0B1A-9E2E14A8B2DA}"/>
+              </a:ext>
+            </a:extLst>
+          </p:cNvPr>
+          <p:cNvPicPr>
+            <a:picLocks noChangeAspect="1"/>
+          </p:cNvPicPr>
+          <p:nvPr/>
+        </p:nvPicPr>
+        <p:blipFill>
+          <a:blip r:embed="rId2">
+            <a:extLst>
+              <a:ext uri="{28A0092B-C50C-407E-A947-70E740481C1C}">
+                <a14:useLocalDpi xmlns:a14="http://schemas.microsoft.com/office/drawing/2010/main" val="0"/>
+              </a:ext>
+            </a:extLst>
+          </a:blip>
+          <a:stretch>
+            <a:fillRect/>
+          </a:stretch>
+        </p:blipFill>
+        <p:spPr>
+          <a:xfrm>
+            <a:off x="292608" y="3405095"/>
+            <a:ext cx="3758184" cy="2029419"/>
+          </a:xfrm>
+          <a:prstGeom prst="rect">
+            <a:avLst/>
+          </a:prstGeom>
+        </p:spPr>
+      </p:pic>
+      <p:pic>
+        <p:nvPicPr>
+          <p:cNvPr id="14" name="Picture 13" descr="A picture containing screenshot, text, colorfulness, rectangle&#10;&#10;Description automatically generated">
+            <a:extLst>
+              <a:ext uri="{FF2B5EF4-FFF2-40B4-BE49-F238E27FC236}">
+                <a16:creationId xmlns:a16="http://schemas.microsoft.com/office/drawing/2014/main" id="{E8F67AAA-64B6-6EC3-AFC6-988519ADB5C2}"/>
+              </a:ext>
+            </a:extLst>
+          </p:cNvPr>
+          <p:cNvPicPr>
+            <a:picLocks noChangeAspect="1"/>
+          </p:cNvPicPr>
+          <p:nvPr/>
+        </p:nvPicPr>
+        <p:blipFill>
+          <a:blip r:embed="rId3">
+            <a:extLst>
+              <a:ext uri="{28A0092B-C50C-407E-A947-70E740481C1C}">
+                <a14:useLocalDpi xmlns:a14="http://schemas.microsoft.com/office/drawing/2010/main" val="0"/>
+              </a:ext>
+            </a:extLst>
+          </a:blip>
+          <a:stretch>
+            <a:fillRect/>
+          </a:stretch>
+        </p:blipFill>
+        <p:spPr>
+          <a:xfrm>
+            <a:off x="4216908" y="3405095"/>
+            <a:ext cx="3758184" cy="2029419"/>
+          </a:xfrm>
+          <a:prstGeom prst="rect">
+            <a:avLst/>
+          </a:prstGeom>
+        </p:spPr>
+      </p:pic>
+      <p:pic>
+        <p:nvPicPr>
+          <p:cNvPr id="16" name="Picture 15" descr="A picture containing screenshot, text, colorfulness, rectangle&#10;&#10;Description automatically generated">
+            <a:extLst>
+              <a:ext uri="{FF2B5EF4-FFF2-40B4-BE49-F238E27FC236}">
+                <a16:creationId xmlns:a16="http://schemas.microsoft.com/office/drawing/2014/main" id="{515E85C7-C734-C020-F9A6-12951359CEB3}"/>
+              </a:ext>
+            </a:extLst>
+          </p:cNvPr>
+          <p:cNvPicPr>
+            <a:picLocks noChangeAspect="1"/>
+          </p:cNvPicPr>
+          <p:nvPr/>
+        </p:nvPicPr>
+        <p:blipFill>
+          <a:blip r:embed="rId4">
+            <a:extLst>
+              <a:ext uri="{28A0092B-C50C-407E-A947-70E740481C1C}">
+                <a14:useLocalDpi xmlns:a14="http://schemas.microsoft.com/office/drawing/2010/main" val="0"/>
+              </a:ext>
+            </a:extLst>
+          </a:blip>
+          <a:stretch>
+            <a:fillRect/>
+          </a:stretch>
+        </p:blipFill>
+        <p:spPr>
+          <a:xfrm>
+            <a:off x="8141208" y="3405095"/>
+            <a:ext cx="3758184" cy="2029419"/>
+          </a:xfrm>
+          <a:prstGeom prst="rect">
+            <a:avLst/>
+          </a:prstGeom>
+        </p:spPr>
+      </p:pic>
     </p:spTree>
     <p:extLst>
       <p:ext uri="{BB962C8B-B14F-4D97-AF65-F5344CB8AC3E}">
@@ -8339,6 +10695,14 @@
 <file path=ppt/slides/slide9.xml><?xml version="1.0" encoding="utf-8"?>
 <p:sld xmlns:a="http://schemas.openxmlformats.org/drawingml/2006/main" xmlns:r="http://schemas.openxmlformats.org/officeDocument/2006/relationships" xmlns:p="http://schemas.openxmlformats.org/presentationml/2006/main">
   <p:cSld>
+    <p:bg>
+      <p:bgPr>
+        <a:solidFill>
+          <a:schemeClr val="bg1"/>
+        </a:solidFill>
+        <a:effectLst/>
+      </p:bgPr>
+    </p:bg>
     <p:spTree>
       <p:nvGrpSpPr>
         <p:cNvPr id="1" name=""/>
@@ -8353,6 +10717,66 @@
           <a:chExt cx="0" cy="0"/>
         </a:xfrm>
       </p:grpSpPr>
+      <p:sp useBgFill="1">
+        <p:nvSpPr>
+          <p:cNvPr id="13" name="Rectangle 12">
+            <a:extLst>
+              <a:ext uri="{FF2B5EF4-FFF2-40B4-BE49-F238E27FC236}">
+                <a16:creationId xmlns:a16="http://schemas.microsoft.com/office/drawing/2014/main" id="{7C98A213-5994-475E-B327-DC6EC27FBA8B}"/>
+              </a:ext>
+              <a:ext uri="{C183D7F6-B498-43B3-948B-1728B52AA6E4}">
+                <adec:decorative xmlns:adec="http://schemas.microsoft.com/office/drawing/2017/decorative" val="1"/>
+              </a:ext>
+            </a:extLst>
+          </p:cNvPr>
+          <p:cNvSpPr>
+            <a:spLocks noGrp="1" noRot="1" noChangeAspect="1" noMove="1" noResize="1" noEditPoints="1" noAdjustHandles="1" noChangeArrowheads="1" noChangeShapeType="1" noTextEdit="1"/>
+          </p:cNvSpPr>
+          <p:nvPr>
+            <p:extLst>
+              <p:ext uri="{386F3935-93C4-4BCD-93E2-E3B085C9AB24}">
+                <p16:designElem xmlns:p16="http://schemas.microsoft.com/office/powerpoint/2015/main" val="1"/>
+              </p:ext>
+            </p:extLst>
+          </p:nvPr>
+        </p:nvSpPr>
+        <p:spPr>
+          <a:xfrm>
+            <a:off x="0" y="0"/>
+            <a:ext cx="12188952" cy="6858000"/>
+          </a:xfrm>
+          <a:prstGeom prst="rect">
+            <a:avLst/>
+          </a:prstGeom>
+          <a:ln>
+            <a:noFill/>
+          </a:ln>
+        </p:spPr>
+        <p:style>
+          <a:lnRef idx="2">
+            <a:schemeClr val="accent1">
+              <a:shade val="50000"/>
+            </a:schemeClr>
+          </a:lnRef>
+          <a:fillRef idx="1">
+            <a:schemeClr val="accent1"/>
+          </a:fillRef>
+          <a:effectRef idx="0">
+            <a:schemeClr val="accent1"/>
+          </a:effectRef>
+          <a:fontRef idx="minor">
+            <a:schemeClr val="lt1"/>
+          </a:fontRef>
+        </p:style>
+        <p:txBody>
+          <a:bodyPr rtlCol="0" anchor="ctr"/>
+          <a:lstStyle/>
+          <a:p>
+            <a:pPr algn="ctr"/>
+            <a:endParaRPr lang="en-US"/>
+          </a:p>
+        </p:txBody>
+      </p:sp>
       <p:sp>
         <p:nvSpPr>
           <p:cNvPr id="2" name="Title 1">
@@ -8369,27 +10793,509 @@
             <p:ph type="title"/>
           </p:nvPr>
         </p:nvSpPr>
-        <p:spPr/>
+        <p:spPr>
+          <a:xfrm>
+            <a:off x="638881" y="670218"/>
+            <a:ext cx="10909640" cy="1065836"/>
+          </a:xfrm>
+        </p:spPr>
         <p:txBody>
-          <a:bodyPr/>
+          <a:bodyPr vert="horz" lIns="91440" tIns="45720" rIns="91440" bIns="45720" rtlCol="0" anchor="ctr">
+            <a:normAutofit/>
+          </a:bodyPr>
           <a:lstStyle/>
           <a:p>
-            <a:r>
-              <a:rPr lang="en-US" dirty="0" err="1"/>
-              <a:t>Graficos</a:t>
-            </a:r>
-            <a:r>
-              <a:rPr lang="en-US" dirty="0"/>
-              <a:t> da </a:t>
-            </a:r>
-            <a:r>
-              <a:rPr lang="en-US" dirty="0" err="1"/>
-              <a:t>precison</a:t>
-            </a:r>
-            <a:endParaRPr lang="en-GB" dirty="0"/>
+            <a:pPr algn="ctr"/>
+            <a:r>
+              <a:rPr lang="en-US" sz="6600" dirty="0">
+                <a:latin typeface="Lexend"/>
+              </a:rPr>
+              <a:t>Decision Tree</a:t>
+            </a:r>
           </a:p>
         </p:txBody>
       </p:sp>
+      <p:sp>
+        <p:nvSpPr>
+          <p:cNvPr id="15" name="sketch line">
+            <a:extLst>
+              <a:ext uri="{FF2B5EF4-FFF2-40B4-BE49-F238E27FC236}">
+                <a16:creationId xmlns:a16="http://schemas.microsoft.com/office/drawing/2014/main" id="{4B030A0D-0DAD-4A99-89BB-419527D6A64B}"/>
+              </a:ext>
+              <a:ext uri="{C183D7F6-B498-43B3-948B-1728B52AA6E4}">
+                <adec:decorative xmlns:adec="http://schemas.microsoft.com/office/drawing/2017/decorative" val="1"/>
+              </a:ext>
+            </a:extLst>
+          </p:cNvPr>
+          <p:cNvSpPr>
+            <a:spLocks noGrp="1" noRot="1" noChangeAspect="1" noMove="1" noResize="1" noEditPoints="1" noAdjustHandles="1" noChangeArrowheads="1" noChangeShapeType="1" noTextEdit="1"/>
+          </p:cNvSpPr>
+          <p:nvPr>
+            <p:extLst>
+              <p:ext uri="{386F3935-93C4-4BCD-93E2-E3B085C9AB24}">
+                <p16:designElem xmlns:p16="http://schemas.microsoft.com/office/powerpoint/2015/main" val="1"/>
+              </p:ext>
+            </p:extLst>
+          </p:nvPr>
+        </p:nvSpPr>
+        <p:spPr>
+          <a:xfrm>
+            <a:off x="3389376" y="1800088"/>
+            <a:ext cx="5410200" cy="18288"/>
+          </a:xfrm>
+          <a:custGeom>
+            <a:avLst/>
+            <a:gdLst>
+              <a:gd name="connsiteX0" fmla="*/ 0 w 5410200"/>
+              <a:gd name="connsiteY0" fmla="*/ 0 h 18288"/>
+              <a:gd name="connsiteX1" fmla="*/ 568071 w 5410200"/>
+              <a:gd name="connsiteY1" fmla="*/ 0 h 18288"/>
+              <a:gd name="connsiteX2" fmla="*/ 1298448 w 5410200"/>
+              <a:gd name="connsiteY2" fmla="*/ 0 h 18288"/>
+              <a:gd name="connsiteX3" fmla="*/ 1920621 w 5410200"/>
+              <a:gd name="connsiteY3" fmla="*/ 0 h 18288"/>
+              <a:gd name="connsiteX4" fmla="*/ 2488692 w 5410200"/>
+              <a:gd name="connsiteY4" fmla="*/ 0 h 18288"/>
+              <a:gd name="connsiteX5" fmla="*/ 3219069 w 5410200"/>
+              <a:gd name="connsiteY5" fmla="*/ 0 h 18288"/>
+              <a:gd name="connsiteX6" fmla="*/ 3895344 w 5410200"/>
+              <a:gd name="connsiteY6" fmla="*/ 0 h 18288"/>
+              <a:gd name="connsiteX7" fmla="*/ 4571619 w 5410200"/>
+              <a:gd name="connsiteY7" fmla="*/ 0 h 18288"/>
+              <a:gd name="connsiteX8" fmla="*/ 5410200 w 5410200"/>
+              <a:gd name="connsiteY8" fmla="*/ 0 h 18288"/>
+              <a:gd name="connsiteX9" fmla="*/ 5410200 w 5410200"/>
+              <a:gd name="connsiteY9" fmla="*/ 18288 h 18288"/>
+              <a:gd name="connsiteX10" fmla="*/ 4842129 w 5410200"/>
+              <a:gd name="connsiteY10" fmla="*/ 18288 h 18288"/>
+              <a:gd name="connsiteX11" fmla="*/ 4328160 w 5410200"/>
+              <a:gd name="connsiteY11" fmla="*/ 18288 h 18288"/>
+              <a:gd name="connsiteX12" fmla="*/ 3597783 w 5410200"/>
+              <a:gd name="connsiteY12" fmla="*/ 18288 h 18288"/>
+              <a:gd name="connsiteX13" fmla="*/ 3029712 w 5410200"/>
+              <a:gd name="connsiteY13" fmla="*/ 18288 h 18288"/>
+              <a:gd name="connsiteX14" fmla="*/ 2299335 w 5410200"/>
+              <a:gd name="connsiteY14" fmla="*/ 18288 h 18288"/>
+              <a:gd name="connsiteX15" fmla="*/ 1514856 w 5410200"/>
+              <a:gd name="connsiteY15" fmla="*/ 18288 h 18288"/>
+              <a:gd name="connsiteX16" fmla="*/ 892683 w 5410200"/>
+              <a:gd name="connsiteY16" fmla="*/ 18288 h 18288"/>
+              <a:gd name="connsiteX17" fmla="*/ 0 w 5410200"/>
+              <a:gd name="connsiteY17" fmla="*/ 18288 h 18288"/>
+              <a:gd name="connsiteX18" fmla="*/ 0 w 5410200"/>
+              <a:gd name="connsiteY18" fmla="*/ 0 h 18288"/>
+            </a:gdLst>
+            <a:ahLst/>
+            <a:cxnLst>
+              <a:cxn ang="0">
+                <a:pos x="connsiteX0" y="connsiteY0"/>
+              </a:cxn>
+              <a:cxn ang="0">
+                <a:pos x="connsiteX1" y="connsiteY1"/>
+              </a:cxn>
+              <a:cxn ang="0">
+                <a:pos x="connsiteX2" y="connsiteY2"/>
+              </a:cxn>
+              <a:cxn ang="0">
+                <a:pos x="connsiteX3" y="connsiteY3"/>
+              </a:cxn>
+              <a:cxn ang="0">
+                <a:pos x="connsiteX4" y="connsiteY4"/>
+              </a:cxn>
+              <a:cxn ang="0">
+                <a:pos x="connsiteX5" y="connsiteY5"/>
+              </a:cxn>
+              <a:cxn ang="0">
+                <a:pos x="connsiteX6" y="connsiteY6"/>
+              </a:cxn>
+              <a:cxn ang="0">
+                <a:pos x="connsiteX7" y="connsiteY7"/>
+              </a:cxn>
+              <a:cxn ang="0">
+                <a:pos x="connsiteX8" y="connsiteY8"/>
+              </a:cxn>
+              <a:cxn ang="0">
+                <a:pos x="connsiteX9" y="connsiteY9"/>
+              </a:cxn>
+              <a:cxn ang="0">
+                <a:pos x="connsiteX10" y="connsiteY10"/>
+              </a:cxn>
+              <a:cxn ang="0">
+                <a:pos x="connsiteX11" y="connsiteY11"/>
+              </a:cxn>
+              <a:cxn ang="0">
+                <a:pos x="connsiteX12" y="connsiteY12"/>
+              </a:cxn>
+              <a:cxn ang="0">
+                <a:pos x="connsiteX13" y="connsiteY13"/>
+              </a:cxn>
+              <a:cxn ang="0">
+                <a:pos x="connsiteX14" y="connsiteY14"/>
+              </a:cxn>
+              <a:cxn ang="0">
+                <a:pos x="connsiteX15" y="connsiteY15"/>
+              </a:cxn>
+              <a:cxn ang="0">
+                <a:pos x="connsiteX16" y="connsiteY16"/>
+              </a:cxn>
+              <a:cxn ang="0">
+                <a:pos x="connsiteX17" y="connsiteY17"/>
+              </a:cxn>
+              <a:cxn ang="0">
+                <a:pos x="connsiteX18" y="connsiteY18"/>
+              </a:cxn>
+            </a:cxnLst>
+            <a:rect l="l" t="t" r="r" b="b"/>
+            <a:pathLst>
+              <a:path w="5410200" h="18288" fill="none" extrusionOk="0">
+                <a:moveTo>
+                  <a:pt x="0" y="0"/>
+                </a:moveTo>
+                <a:cubicBezTo>
+                  <a:pt x="163050" y="-18707"/>
+                  <a:pt x="319321" y="-16364"/>
+                  <a:pt x="568071" y="0"/>
+                </a:cubicBezTo>
+                <a:cubicBezTo>
+                  <a:pt x="816821" y="16364"/>
+                  <a:pt x="1013224" y="-7268"/>
+                  <a:pt x="1298448" y="0"/>
+                </a:cubicBezTo>
+                <a:cubicBezTo>
+                  <a:pt x="1583672" y="7268"/>
+                  <a:pt x="1631711" y="-3367"/>
+                  <a:pt x="1920621" y="0"/>
+                </a:cubicBezTo>
+                <a:cubicBezTo>
+                  <a:pt x="2209531" y="3367"/>
+                  <a:pt x="2364420" y="-19184"/>
+                  <a:pt x="2488692" y="0"/>
+                </a:cubicBezTo>
+                <a:cubicBezTo>
+                  <a:pt x="2612964" y="19184"/>
+                  <a:pt x="3023298" y="-34627"/>
+                  <a:pt x="3219069" y="0"/>
+                </a:cubicBezTo>
+                <a:cubicBezTo>
+                  <a:pt x="3414840" y="34627"/>
+                  <a:pt x="3656810" y="24043"/>
+                  <a:pt x="3895344" y="0"/>
+                </a:cubicBezTo>
+                <a:cubicBezTo>
+                  <a:pt x="4133879" y="-24043"/>
+                  <a:pt x="4393984" y="-19577"/>
+                  <a:pt x="4571619" y="0"/>
+                </a:cubicBezTo>
+                <a:cubicBezTo>
+                  <a:pt x="4749255" y="19577"/>
+                  <a:pt x="5179928" y="-6281"/>
+                  <a:pt x="5410200" y="0"/>
+                </a:cubicBezTo>
+                <a:cubicBezTo>
+                  <a:pt x="5410730" y="6954"/>
+                  <a:pt x="5410934" y="12839"/>
+                  <a:pt x="5410200" y="18288"/>
+                </a:cubicBezTo>
+                <a:cubicBezTo>
+                  <a:pt x="5139060" y="6751"/>
+                  <a:pt x="5121593" y="31035"/>
+                  <a:pt x="4842129" y="18288"/>
+                </a:cubicBezTo>
+                <a:cubicBezTo>
+                  <a:pt x="4562665" y="5541"/>
+                  <a:pt x="4448273" y="9487"/>
+                  <a:pt x="4328160" y="18288"/>
+                </a:cubicBezTo>
+                <a:cubicBezTo>
+                  <a:pt x="4208047" y="27089"/>
+                  <a:pt x="3760936" y="22567"/>
+                  <a:pt x="3597783" y="18288"/>
+                </a:cubicBezTo>
+                <a:cubicBezTo>
+                  <a:pt x="3434630" y="14009"/>
+                  <a:pt x="3299718" y="33213"/>
+                  <a:pt x="3029712" y="18288"/>
+                </a:cubicBezTo>
+                <a:cubicBezTo>
+                  <a:pt x="2759706" y="3363"/>
+                  <a:pt x="2640159" y="27394"/>
+                  <a:pt x="2299335" y="18288"/>
+                </a:cubicBezTo>
+                <a:cubicBezTo>
+                  <a:pt x="1958511" y="9182"/>
+                  <a:pt x="1801186" y="28985"/>
+                  <a:pt x="1514856" y="18288"/>
+                </a:cubicBezTo>
+                <a:cubicBezTo>
+                  <a:pt x="1228526" y="7591"/>
+                  <a:pt x="1063509" y="-5305"/>
+                  <a:pt x="892683" y="18288"/>
+                </a:cubicBezTo>
+                <a:cubicBezTo>
+                  <a:pt x="721857" y="41881"/>
+                  <a:pt x="186945" y="-20897"/>
+                  <a:pt x="0" y="18288"/>
+                </a:cubicBezTo>
+                <a:cubicBezTo>
+                  <a:pt x="-570" y="9279"/>
+                  <a:pt x="132" y="5100"/>
+                  <a:pt x="0" y="0"/>
+                </a:cubicBezTo>
+                <a:close/>
+              </a:path>
+              <a:path w="5410200" h="18288" stroke="0" extrusionOk="0">
+                <a:moveTo>
+                  <a:pt x="0" y="0"/>
+                </a:moveTo>
+                <a:cubicBezTo>
+                  <a:pt x="285096" y="-4925"/>
+                  <a:pt x="376456" y="22268"/>
+                  <a:pt x="622173" y="0"/>
+                </a:cubicBezTo>
+                <a:cubicBezTo>
+                  <a:pt x="867890" y="-22268"/>
+                  <a:pt x="1031392" y="7228"/>
+                  <a:pt x="1136142" y="0"/>
+                </a:cubicBezTo>
+                <a:cubicBezTo>
+                  <a:pt x="1240892" y="-7228"/>
+                  <a:pt x="1561853" y="9877"/>
+                  <a:pt x="1920621" y="0"/>
+                </a:cubicBezTo>
+                <a:cubicBezTo>
+                  <a:pt x="2279389" y="-9877"/>
+                  <a:pt x="2367255" y="19546"/>
+                  <a:pt x="2542794" y="0"/>
+                </a:cubicBezTo>
+                <a:cubicBezTo>
+                  <a:pt x="2718333" y="-19546"/>
+                  <a:pt x="2866732" y="-22226"/>
+                  <a:pt x="3164967" y="0"/>
+                </a:cubicBezTo>
+                <a:cubicBezTo>
+                  <a:pt x="3463202" y="22226"/>
+                  <a:pt x="3568055" y="-2765"/>
+                  <a:pt x="3949446" y="0"/>
+                </a:cubicBezTo>
+                <a:cubicBezTo>
+                  <a:pt x="4330837" y="2765"/>
+                  <a:pt x="4287895" y="10557"/>
+                  <a:pt x="4517517" y="0"/>
+                </a:cubicBezTo>
+                <a:cubicBezTo>
+                  <a:pt x="4747139" y="-10557"/>
+                  <a:pt x="5149588" y="8716"/>
+                  <a:pt x="5410200" y="0"/>
+                </a:cubicBezTo>
+                <a:cubicBezTo>
+                  <a:pt x="5409517" y="5414"/>
+                  <a:pt x="5409480" y="12510"/>
+                  <a:pt x="5410200" y="18288"/>
+                </a:cubicBezTo>
+                <a:cubicBezTo>
+                  <a:pt x="5163327" y="41494"/>
+                  <a:pt x="5008749" y="10693"/>
+                  <a:pt x="4842129" y="18288"/>
+                </a:cubicBezTo>
+                <a:cubicBezTo>
+                  <a:pt x="4675509" y="25883"/>
+                  <a:pt x="4433401" y="-615"/>
+                  <a:pt x="4165854" y="18288"/>
+                </a:cubicBezTo>
+                <a:cubicBezTo>
+                  <a:pt x="3898308" y="37191"/>
+                  <a:pt x="3809032" y="-8710"/>
+                  <a:pt x="3543681" y="18288"/>
+                </a:cubicBezTo>
+                <a:cubicBezTo>
+                  <a:pt x="3278330" y="45286"/>
+                  <a:pt x="3073876" y="-15917"/>
+                  <a:pt x="2759202" y="18288"/>
+                </a:cubicBezTo>
+                <a:cubicBezTo>
+                  <a:pt x="2444528" y="52493"/>
+                  <a:pt x="2204144" y="3372"/>
+                  <a:pt x="1974723" y="18288"/>
+                </a:cubicBezTo>
+                <a:cubicBezTo>
+                  <a:pt x="1745302" y="33204"/>
+                  <a:pt x="1602335" y="31490"/>
+                  <a:pt x="1406652" y="18288"/>
+                </a:cubicBezTo>
+                <a:cubicBezTo>
+                  <a:pt x="1210969" y="5086"/>
+                  <a:pt x="923948" y="3161"/>
+                  <a:pt x="730377" y="18288"/>
+                </a:cubicBezTo>
+                <a:cubicBezTo>
+                  <a:pt x="536806" y="33415"/>
+                  <a:pt x="336496" y="-141"/>
+                  <a:pt x="0" y="18288"/>
+                </a:cubicBezTo>
+                <a:cubicBezTo>
+                  <a:pt x="-306" y="11061"/>
+                  <a:pt x="-655" y="7751"/>
+                  <a:pt x="0" y="0"/>
+                </a:cubicBezTo>
+                <a:close/>
+              </a:path>
+            </a:pathLst>
+          </a:custGeom>
+          <a:solidFill>
+            <a:schemeClr val="accent2"/>
+          </a:solidFill>
+          <a:ln w="41275" cap="rnd">
+            <a:solidFill>
+              <a:schemeClr val="accent2"/>
+            </a:solidFill>
+            <a:round/>
+            <a:extLst>
+              <a:ext uri="{C807C97D-BFC1-408E-A445-0C87EB9F89A2}">
+                <ask:lineSketchStyleProps xmlns:ask="http://schemas.microsoft.com/office/drawing/2018/sketchyshapes" sd="1219033472">
+                  <a:prstGeom prst="rect">
+                    <a:avLst/>
+                  </a:prstGeom>
+                  <ask:type>
+                    <ask:lineSketchFreehand/>
+                  </ask:type>
+                </ask:lineSketchStyleProps>
+              </a:ext>
+            </a:extLst>
+          </a:ln>
+        </p:spPr>
+        <p:style>
+          <a:lnRef idx="2">
+            <a:schemeClr val="accent1">
+              <a:shade val="50000"/>
+            </a:schemeClr>
+          </a:lnRef>
+          <a:fillRef idx="1">
+            <a:schemeClr val="accent1"/>
+          </a:fillRef>
+          <a:effectRef idx="0">
+            <a:schemeClr val="accent1"/>
+          </a:effectRef>
+          <a:fontRef idx="minor">
+            <a:schemeClr val="lt1"/>
+          </a:fontRef>
+        </p:style>
+        <p:txBody>
+          <a:bodyPr rtlCol="0" anchor="ctr"/>
+          <a:lstStyle/>
+          <a:p>
+            <a:pPr algn="ctr"/>
+            <a:endParaRPr lang="en-US"/>
+          </a:p>
+        </p:txBody>
+      </p:sp>
+      <p:pic>
+        <p:nvPicPr>
+          <p:cNvPr id="8" name="Picture 7" descr="A picture containing screenshot, text, colorfulness, rectangle&#10;&#10;Description automatically generated">
+            <a:extLst>
+              <a:ext uri="{FF2B5EF4-FFF2-40B4-BE49-F238E27FC236}">
+                <a16:creationId xmlns:a16="http://schemas.microsoft.com/office/drawing/2014/main" id="{1D34901C-8F7A-6938-4930-92A68F1BADB0}"/>
+              </a:ext>
+            </a:extLst>
+          </p:cNvPr>
+          <p:cNvPicPr>
+            <a:picLocks noChangeAspect="1"/>
+          </p:cNvPicPr>
+          <p:nvPr/>
+        </p:nvPicPr>
+        <p:blipFill>
+          <a:blip r:embed="rId2">
+            <a:extLst>
+              <a:ext uri="{28A0092B-C50C-407E-A947-70E740481C1C}">
+                <a14:useLocalDpi xmlns:a14="http://schemas.microsoft.com/office/drawing/2010/main" val="0"/>
+              </a:ext>
+            </a:extLst>
+          </a:blip>
+          <a:stretch>
+            <a:fillRect/>
+          </a:stretch>
+        </p:blipFill>
+        <p:spPr>
+          <a:xfrm>
+            <a:off x="292608" y="3405095"/>
+            <a:ext cx="3758184" cy="2029419"/>
+          </a:xfrm>
+          <a:prstGeom prst="rect">
+            <a:avLst/>
+          </a:prstGeom>
+        </p:spPr>
+      </p:pic>
+      <p:pic>
+        <p:nvPicPr>
+          <p:cNvPr id="4" name="Picture 3" descr="A picture containing screenshot, text, colorfulness, rectangle&#10;&#10;Description automatically generated">
+            <a:extLst>
+              <a:ext uri="{FF2B5EF4-FFF2-40B4-BE49-F238E27FC236}">
+                <a16:creationId xmlns:a16="http://schemas.microsoft.com/office/drawing/2014/main" id="{4CB37078-485B-EA8B-4E7A-01E074B052AD}"/>
+              </a:ext>
+            </a:extLst>
+          </p:cNvPr>
+          <p:cNvPicPr>
+            <a:picLocks noChangeAspect="1"/>
+          </p:cNvPicPr>
+          <p:nvPr/>
+        </p:nvPicPr>
+        <p:blipFill>
+          <a:blip r:embed="rId3">
+            <a:extLst>
+              <a:ext uri="{28A0092B-C50C-407E-A947-70E740481C1C}">
+                <a14:useLocalDpi xmlns:a14="http://schemas.microsoft.com/office/drawing/2010/main" val="0"/>
+              </a:ext>
+            </a:extLst>
+          </a:blip>
+          <a:stretch>
+            <a:fillRect/>
+          </a:stretch>
+        </p:blipFill>
+        <p:spPr>
+          <a:xfrm>
+            <a:off x="4216908" y="3405095"/>
+            <a:ext cx="3758184" cy="2029419"/>
+          </a:xfrm>
+          <a:prstGeom prst="rect">
+            <a:avLst/>
+          </a:prstGeom>
+        </p:spPr>
+      </p:pic>
+      <p:pic>
+        <p:nvPicPr>
+          <p:cNvPr id="6" name="Picture 5" descr="A picture containing screenshot, text, colorfulness, rectangle&#10;&#10;Description automatically generated">
+            <a:extLst>
+              <a:ext uri="{FF2B5EF4-FFF2-40B4-BE49-F238E27FC236}">
+                <a16:creationId xmlns:a16="http://schemas.microsoft.com/office/drawing/2014/main" id="{FEF650CE-3F46-C0CB-F749-9338B326F980}"/>
+              </a:ext>
+            </a:extLst>
+          </p:cNvPr>
+          <p:cNvPicPr>
+            <a:picLocks noChangeAspect="1"/>
+          </p:cNvPicPr>
+          <p:nvPr/>
+        </p:nvPicPr>
+        <p:blipFill>
+          <a:blip r:embed="rId4">
+            <a:extLst>
+              <a:ext uri="{28A0092B-C50C-407E-A947-70E740481C1C}">
+                <a14:useLocalDpi xmlns:a14="http://schemas.microsoft.com/office/drawing/2010/main" val="0"/>
+              </a:ext>
+            </a:extLst>
+          </a:blip>
+          <a:stretch>
+            <a:fillRect/>
+          </a:stretch>
+        </p:blipFill>
+        <p:spPr>
+          <a:xfrm>
+            <a:off x="8141208" y="3405095"/>
+            <a:ext cx="3758184" cy="2029419"/>
+          </a:xfrm>
+          <a:prstGeom prst="rect">
+            <a:avLst/>
+          </a:prstGeom>
+        </p:spPr>
+      </p:pic>
     </p:spTree>
     <p:extLst>
       <p:ext uri="{BB962C8B-B14F-4D97-AF65-F5344CB8AC3E}">

</xml_diff>